<commit_message>
correction artifacts parameter group rds
</commit_message>
<xml_diff>
--- a/docs/AWSSandbox.pptx
+++ b/docs/AWSSandbox.pptx
@@ -5,13 +5,14 @@
     <p:sldMasterId id="2147483648" r:id="rId1"/>
   </p:sldMasterIdLst>
   <p:notesMasterIdLst>
-    <p:notesMasterId r:id="rId6"/>
+    <p:notesMasterId r:id="rId7"/>
   </p:notesMasterIdLst>
   <p:sldIdLst>
     <p:sldId id="3021" r:id="rId2"/>
     <p:sldId id="3024" r:id="rId3"/>
     <p:sldId id="3022" r:id="rId4"/>
     <p:sldId id="3023" r:id="rId5"/>
+    <p:sldId id="3025" r:id="rId6"/>
   </p:sldIdLst>
   <p:sldSz cx="12192000" cy="6858000"/>
   <p:notesSz cx="6858000" cy="9144000"/>
@@ -1736,7 +1737,7 @@
           <a:p>
             <a:fld id="{8AE03B48-8FAF-42EC-87C1-71BAEDFA6291}" type="datetimeFigureOut">
               <a:rPr lang="es-CO" smtClean="0"/>
-              <a:t>25/06/2021</a:t>
+              <a:t>1/07/2021</a:t>
             </a:fld>
             <a:endParaRPr lang="es-CO"/>
           </a:p>
@@ -2172,6 +2173,90 @@
 </p:notes>
 </file>
 
+<file path=ppt/notesSlides/notesSlide3.xml><?xml version="1.0" encoding="utf-8"?>
+<p:notes xmlns:a="http://schemas.openxmlformats.org/drawingml/2006/main" xmlns:r="http://schemas.openxmlformats.org/officeDocument/2006/relationships" xmlns:p="http://schemas.openxmlformats.org/presentationml/2006/main">
+  <p:cSld>
+    <p:spTree>
+      <p:nvGrpSpPr>
+        <p:cNvPr id="1" name=""/>
+        <p:cNvGrpSpPr/>
+        <p:nvPr/>
+      </p:nvGrpSpPr>
+      <p:grpSpPr>
+        <a:xfrm>
+          <a:off x="0" y="0"/>
+          <a:ext cx="0" cy="0"/>
+          <a:chOff x="0" y="0"/>
+          <a:chExt cx="0" cy="0"/>
+        </a:xfrm>
+      </p:grpSpPr>
+      <p:sp>
+        <p:nvSpPr>
+          <p:cNvPr id="2" name="Marcador de imagen de diapositiva 1"/>
+          <p:cNvSpPr>
+            <a:spLocks noGrp="1" noRot="1" noChangeAspect="1"/>
+          </p:cNvSpPr>
+          <p:nvPr>
+            <p:ph type="sldImg"/>
+          </p:nvPr>
+        </p:nvSpPr>
+        <p:spPr/>
+      </p:sp>
+      <p:sp>
+        <p:nvSpPr>
+          <p:cNvPr id="3" name="Marcador de notas 2"/>
+          <p:cNvSpPr>
+            <a:spLocks noGrp="1"/>
+          </p:cNvSpPr>
+          <p:nvPr>
+            <p:ph type="body" idx="1"/>
+          </p:nvPr>
+        </p:nvSpPr>
+        <p:spPr/>
+        <p:txBody>
+          <a:bodyPr/>
+          <a:lstStyle/>
+          <a:p>
+            <a:endParaRPr lang="es-CO" dirty="0"/>
+          </a:p>
+        </p:txBody>
+      </p:sp>
+      <p:sp>
+        <p:nvSpPr>
+          <p:cNvPr id="4" name="Marcador de número de diapositiva 3"/>
+          <p:cNvSpPr>
+            <a:spLocks noGrp="1"/>
+          </p:cNvSpPr>
+          <p:nvPr>
+            <p:ph type="sldNum" sz="quarter" idx="5"/>
+          </p:nvPr>
+        </p:nvSpPr>
+        <p:spPr/>
+        <p:txBody>
+          <a:bodyPr/>
+          <a:lstStyle/>
+          <a:p>
+            <a:fld id="{0728F034-4B31-4404-ACB0-4605F1533780}" type="slidenum">
+              <a:rPr lang="es-CO" smtClean="0"/>
+              <a:t>5</a:t>
+            </a:fld>
+            <a:endParaRPr lang="es-CO"/>
+          </a:p>
+        </p:txBody>
+      </p:sp>
+    </p:spTree>
+    <p:extLst>
+      <p:ext uri="{BB962C8B-B14F-4D97-AF65-F5344CB8AC3E}">
+        <p14:creationId xmlns:p14="http://schemas.microsoft.com/office/powerpoint/2010/main" val="2148868039"/>
+      </p:ext>
+    </p:extLst>
+  </p:cSld>
+  <p:clrMapOvr>
+    <a:masterClrMapping/>
+  </p:clrMapOvr>
+</p:notes>
+</file>
+
 <file path=ppt/slideLayouts/slideLayout1.xml><?xml version="1.0" encoding="utf-8"?>
 <p:sldLayout xmlns:a="http://schemas.openxmlformats.org/drawingml/2006/main" xmlns:r="http://schemas.openxmlformats.org/officeDocument/2006/relationships" xmlns:p="http://schemas.openxmlformats.org/presentationml/2006/main" type="title" preserve="1">
   <p:cSld name="Diapositiva de título">
@@ -2321,7 +2406,7 @@
           <a:p>
             <a:fld id="{6784D3A8-228D-4768-93E2-78972CC3B9E5}" type="datetimeFigureOut">
               <a:rPr lang="es-CO" smtClean="0"/>
-              <a:t>25/06/2021</a:t>
+              <a:t>1/07/2021</a:t>
             </a:fld>
             <a:endParaRPr lang="es-CO"/>
           </a:p>
@@ -2521,7 +2606,7 @@
           <a:p>
             <a:fld id="{6784D3A8-228D-4768-93E2-78972CC3B9E5}" type="datetimeFigureOut">
               <a:rPr lang="es-CO" smtClean="0"/>
-              <a:t>25/06/2021</a:t>
+              <a:t>1/07/2021</a:t>
             </a:fld>
             <a:endParaRPr lang="es-CO"/>
           </a:p>
@@ -2731,7 +2816,7 @@
           <a:p>
             <a:fld id="{6784D3A8-228D-4768-93E2-78972CC3B9E5}" type="datetimeFigureOut">
               <a:rPr lang="es-CO" smtClean="0"/>
-              <a:t>25/06/2021</a:t>
+              <a:t>1/07/2021</a:t>
             </a:fld>
             <a:endParaRPr lang="es-CO"/>
           </a:p>
@@ -3554,7 +3639,7 @@
           <a:p>
             <a:fld id="{6784D3A8-228D-4768-93E2-78972CC3B9E5}" type="datetimeFigureOut">
               <a:rPr lang="es-CO" smtClean="0"/>
-              <a:t>25/06/2021</a:t>
+              <a:t>1/07/2021</a:t>
             </a:fld>
             <a:endParaRPr lang="es-CO"/>
           </a:p>
@@ -3830,7 +3915,7 @@
           <a:p>
             <a:fld id="{6784D3A8-228D-4768-93E2-78972CC3B9E5}" type="datetimeFigureOut">
               <a:rPr lang="es-CO" smtClean="0"/>
-              <a:t>25/06/2021</a:t>
+              <a:t>1/07/2021</a:t>
             </a:fld>
             <a:endParaRPr lang="es-CO"/>
           </a:p>
@@ -4098,7 +4183,7 @@
           <a:p>
             <a:fld id="{6784D3A8-228D-4768-93E2-78972CC3B9E5}" type="datetimeFigureOut">
               <a:rPr lang="es-CO" smtClean="0"/>
-              <a:t>25/06/2021</a:t>
+              <a:t>1/07/2021</a:t>
             </a:fld>
             <a:endParaRPr lang="es-CO"/>
           </a:p>
@@ -4513,7 +4598,7 @@
           <a:p>
             <a:fld id="{6784D3A8-228D-4768-93E2-78972CC3B9E5}" type="datetimeFigureOut">
               <a:rPr lang="es-CO" smtClean="0"/>
-              <a:t>25/06/2021</a:t>
+              <a:t>1/07/2021</a:t>
             </a:fld>
             <a:endParaRPr lang="es-CO"/>
           </a:p>
@@ -4655,7 +4740,7 @@
           <a:p>
             <a:fld id="{6784D3A8-228D-4768-93E2-78972CC3B9E5}" type="datetimeFigureOut">
               <a:rPr lang="es-CO" smtClean="0"/>
-              <a:t>25/06/2021</a:t>
+              <a:t>1/07/2021</a:t>
             </a:fld>
             <a:endParaRPr lang="es-CO"/>
           </a:p>
@@ -4768,7 +4853,7 @@
           <a:p>
             <a:fld id="{6784D3A8-228D-4768-93E2-78972CC3B9E5}" type="datetimeFigureOut">
               <a:rPr lang="es-CO" smtClean="0"/>
-              <a:t>25/06/2021</a:t>
+              <a:t>1/07/2021</a:t>
             </a:fld>
             <a:endParaRPr lang="es-CO"/>
           </a:p>
@@ -5081,7 +5166,7 @@
           <a:p>
             <a:fld id="{6784D3A8-228D-4768-93E2-78972CC3B9E5}" type="datetimeFigureOut">
               <a:rPr lang="es-CO" smtClean="0"/>
-              <a:t>25/06/2021</a:t>
+              <a:t>1/07/2021</a:t>
             </a:fld>
             <a:endParaRPr lang="es-CO"/>
           </a:p>
@@ -5370,7 +5455,7 @@
           <a:p>
             <a:fld id="{6784D3A8-228D-4768-93E2-78972CC3B9E5}" type="datetimeFigureOut">
               <a:rPr lang="es-CO" smtClean="0"/>
-              <a:t>25/06/2021</a:t>
+              <a:t>1/07/2021</a:t>
             </a:fld>
             <a:endParaRPr lang="es-CO"/>
           </a:p>
@@ -5613,7 +5698,7 @@
           <a:p>
             <a:fld id="{6784D3A8-228D-4768-93E2-78972CC3B9E5}" type="datetimeFigureOut">
               <a:rPr lang="es-CO" smtClean="0"/>
-              <a:t>25/06/2021</a:t>
+              <a:t>1/07/2021</a:t>
             </a:fld>
             <a:endParaRPr lang="es-CO"/>
           </a:p>
@@ -7101,7 +7186,7 @@
         </p:nvSpPr>
         <p:spPr>
           <a:xfrm>
-            <a:off x="2163476" y="1896634"/>
+            <a:off x="1995314" y="1896634"/>
             <a:ext cx="1464141" cy="370748"/>
           </a:xfrm>
           <a:prstGeom prst="rect">
@@ -7517,7 +7602,7 @@
         </p:blipFill>
         <p:spPr>
           <a:xfrm>
-            <a:off x="1966453" y="1865759"/>
+            <a:off x="1798291" y="1865759"/>
             <a:ext cx="194925" cy="194925"/>
           </a:xfrm>
           <a:prstGeom prst="rect">
@@ -7542,9 +7627,9 @@
           <p:nvPr/>
         </p:nvCxnSpPr>
         <p:spPr>
-          <a:xfrm rot="10800000" flipV="1">
-            <a:off x="5283136" y="2732454"/>
-            <a:ext cx="727779" cy="156"/>
+          <a:xfrm rot="10800000">
+            <a:off x="5428024" y="2143692"/>
+            <a:ext cx="582890" cy="588762"/>
           </a:xfrm>
           <a:prstGeom prst="bentConnector3">
             <a:avLst>
@@ -7750,9 +7835,9 @@
           <p:nvPr/>
         </p:nvCxnSpPr>
         <p:spPr>
-          <a:xfrm rot="10800000" flipV="1">
-            <a:off x="5321405" y="4828611"/>
-            <a:ext cx="682921" cy="6463"/>
+          <a:xfrm rot="10800000">
+            <a:off x="5338919" y="4256260"/>
+            <a:ext cx="665407" cy="572352"/>
           </a:xfrm>
           <a:prstGeom prst="bentConnector3">
             <a:avLst>
@@ -7795,7 +7880,7 @@
         </p:nvSpPr>
         <p:spPr>
           <a:xfrm>
-            <a:off x="2110116" y="2723517"/>
+            <a:off x="1941954" y="2723517"/>
             <a:ext cx="1515051" cy="438230"/>
           </a:xfrm>
           <a:prstGeom prst="rect">
@@ -7883,7 +7968,7 @@
         </p:nvSpPr>
         <p:spPr>
           <a:xfrm>
-            <a:off x="2121089" y="4021241"/>
+            <a:off x="1952927" y="4021241"/>
             <a:ext cx="1496615" cy="471074"/>
           </a:xfrm>
           <a:prstGeom prst="rect">
@@ -7955,7 +8040,7 @@
         </p:nvSpPr>
         <p:spPr>
           <a:xfrm>
-            <a:off x="2155986" y="5057792"/>
+            <a:off x="1987824" y="5057792"/>
             <a:ext cx="1464141" cy="473138"/>
           </a:xfrm>
           <a:prstGeom prst="rect">
@@ -8028,7 +8113,7 @@
         </p:nvCxnSpPr>
         <p:spPr>
           <a:xfrm rot="10800000" flipV="1">
-            <a:off x="2121090" y="2082008"/>
+            <a:off x="1952928" y="2082008"/>
             <a:ext cx="42387" cy="2174770"/>
           </a:xfrm>
           <a:prstGeom prst="bentConnector3">
@@ -8076,7 +8161,7 @@
         </p:nvCxnSpPr>
         <p:spPr>
           <a:xfrm rot="16200000" flipH="1">
-            <a:off x="2438772" y="3590616"/>
+            <a:off x="2270610" y="3590616"/>
             <a:ext cx="859494" cy="1755"/>
           </a:xfrm>
           <a:prstGeom prst="bentConnector3">
@@ -8124,7 +8209,7 @@
         </p:nvCxnSpPr>
         <p:spPr>
           <a:xfrm>
-            <a:off x="3617704" y="4256778"/>
+            <a:off x="3449542" y="4256778"/>
             <a:ext cx="2423" cy="1037583"/>
           </a:xfrm>
           <a:prstGeom prst="bentConnector3">
@@ -8212,19 +8297,20 @@
             </a:extLst>
           </p:cNvPr>
           <p:cNvCxnSpPr>
+            <a:cxnSpLocks/>
             <a:stCxn id="8" idx="0"/>
             <a:endCxn id="44" idx="0"/>
           </p:cNvCxnSpPr>
           <p:nvPr/>
         </p:nvCxnSpPr>
         <p:spPr>
-          <a:xfrm rot="16200000" flipH="1" flipV="1">
-            <a:off x="5667794" y="1551258"/>
-            <a:ext cx="57633" cy="1707975"/>
+          <a:xfrm rot="16200000" flipV="1">
+            <a:off x="5464732" y="1290564"/>
+            <a:ext cx="401260" cy="1770472"/>
           </a:xfrm>
           <a:prstGeom prst="bentConnector3">
             <a:avLst>
-              <a:gd name="adj1" fmla="val -396648"/>
+              <a:gd name="adj1" fmla="val 156971"/>
             </a:avLst>
           </a:prstGeom>
           <a:ln>
@@ -8257,109 +8343,19 @@
           </p:cNvPr>
           <p:cNvCxnSpPr>
             <a:cxnSpLocks/>
-            <a:stCxn id="44" idx="2"/>
+            <a:stCxn id="102" idx="2"/>
             <a:endCxn id="8" idx="2"/>
           </p:cNvCxnSpPr>
           <p:nvPr/>
         </p:nvCxnSpPr>
         <p:spPr>
-          <a:xfrm rot="16200000" flipH="1">
-            <a:off x="5667950" y="2205829"/>
-            <a:ext cx="57320" cy="1707975"/>
+          <a:xfrm rot="5400000" flipH="1" flipV="1">
+            <a:off x="5635083" y="2242468"/>
+            <a:ext cx="69506" cy="1761523"/>
           </a:xfrm>
           <a:prstGeom prst="bentConnector3">
             <a:avLst>
-              <a:gd name="adj1" fmla="val 498814"/>
-            </a:avLst>
-          </a:prstGeom>
-          <a:ln>
-            <a:tailEnd type="triangle"/>
-          </a:ln>
-        </p:spPr>
-        <p:style>
-          <a:lnRef idx="1">
-            <a:schemeClr val="accent1"/>
-          </a:lnRef>
-          <a:fillRef idx="0">
-            <a:schemeClr val="accent1"/>
-          </a:fillRef>
-          <a:effectRef idx="0">
-            <a:schemeClr val="accent1"/>
-          </a:effectRef>
-          <a:fontRef idx="minor">
-            <a:schemeClr val="tx1"/>
-          </a:fontRef>
-        </p:style>
-      </p:cxnSp>
-      <p:cxnSp>
-        <p:nvCxnSpPr>
-          <p:cNvPr id="71" name="Conector: angular 70">
-            <a:extLst>
-              <a:ext uri="{FF2B5EF4-FFF2-40B4-BE49-F238E27FC236}">
-                <a16:creationId xmlns:a16="http://schemas.microsoft.com/office/drawing/2014/main" id="{EFE59015-58C5-4314-9C60-C8DD4C9FA700}"/>
-              </a:ext>
-            </a:extLst>
-          </p:cNvPr>
-          <p:cNvCxnSpPr>
-            <a:cxnSpLocks/>
-            <a:stCxn id="103" idx="0"/>
-            <a:endCxn id="90" idx="0"/>
-          </p:cNvCxnSpPr>
-          <p:nvPr/>
-        </p:nvCxnSpPr>
-        <p:spPr>
-          <a:xfrm rot="16200000" flipH="1" flipV="1">
-            <a:off x="5689585" y="3682104"/>
-            <a:ext cx="63940" cy="1644908"/>
-          </a:xfrm>
-          <a:prstGeom prst="bentConnector3">
-            <a:avLst>
-              <a:gd name="adj1" fmla="val -357523"/>
-            </a:avLst>
-          </a:prstGeom>
-          <a:ln>
-            <a:tailEnd type="triangle"/>
-          </a:ln>
-        </p:spPr>
-        <p:style>
-          <a:lnRef idx="1">
-            <a:schemeClr val="accent1"/>
-          </a:lnRef>
-          <a:fillRef idx="0">
-            <a:schemeClr val="accent1"/>
-          </a:fillRef>
-          <a:effectRef idx="0">
-            <a:schemeClr val="accent1"/>
-          </a:effectRef>
-          <a:fontRef idx="minor">
-            <a:schemeClr val="tx1"/>
-          </a:fontRef>
-        </p:style>
-      </p:cxnSp>
-      <p:cxnSp>
-        <p:nvCxnSpPr>
-          <p:cNvPr id="74" name="Conector: angular 73">
-            <a:extLst>
-              <a:ext uri="{FF2B5EF4-FFF2-40B4-BE49-F238E27FC236}">
-                <a16:creationId xmlns:a16="http://schemas.microsoft.com/office/drawing/2014/main" id="{C0D72A49-EE43-4F51-B931-913B99D5C86C}"/>
-              </a:ext>
-            </a:extLst>
-          </p:cNvPr>
-          <p:cNvCxnSpPr>
-            <a:cxnSpLocks/>
-            <a:stCxn id="90" idx="2"/>
-            <a:endCxn id="103" idx="2"/>
-          </p:cNvCxnSpPr>
-          <p:nvPr/>
-        </p:nvCxnSpPr>
-        <p:spPr>
-          <a:xfrm rot="16200000" flipH="1">
-            <a:off x="5696049" y="4336674"/>
-            <a:ext cx="51013" cy="1644908"/>
-          </a:xfrm>
-          <a:prstGeom prst="bentConnector3">
-            <a:avLst>
-              <a:gd name="adj1" fmla="val 548121"/>
+              <a:gd name="adj1" fmla="val -328892"/>
             </a:avLst>
           </a:prstGeom>
           <a:ln>
@@ -8583,7 +8579,7 @@
         </p:nvCxnSpPr>
         <p:spPr>
           <a:xfrm rot="10800000" flipH="1" flipV="1">
-            <a:off x="2110116" y="2942631"/>
+            <a:off x="1941954" y="2942631"/>
             <a:ext cx="45870" cy="2351729"/>
           </a:xfrm>
           <a:prstGeom prst="bentConnector3">
@@ -8686,7 +8682,7 @@
         </p:nvCxnSpPr>
         <p:spPr>
           <a:xfrm flipH="1">
-            <a:off x="3625167" y="2082008"/>
+            <a:off x="3457005" y="2082008"/>
             <a:ext cx="2450" cy="860624"/>
           </a:xfrm>
           <a:prstGeom prst="bentConnector3">
@@ -8730,8 +8726,8 @@
         </p:nvSpPr>
         <p:spPr>
           <a:xfrm>
-            <a:off x="4402111" y="2434063"/>
-            <a:ext cx="881024" cy="597094"/>
+            <a:off x="4132227" y="1975170"/>
+            <a:ext cx="1295797" cy="337044"/>
           </a:xfrm>
           <a:prstGeom prst="rect">
             <a:avLst/>
@@ -8766,15 +8762,7 @@
             <a:pPr algn="ctr"/>
             <a:r>
               <a:rPr lang="es-CO" sz="1200" dirty="0"/>
-              <a:t>Security </a:t>
-            </a:r>
-            <a:r>
-              <a:rPr lang="es-CO" sz="1200" dirty="0" err="1"/>
-              <a:t>Group</a:t>
-            </a:r>
-            <a:r>
-              <a:rPr lang="es-CO" sz="1200" dirty="0"/>
-              <a:t> DMZ</a:t>
+              <a:t>rSecurityGroupEc2Public</a:t>
             </a:r>
           </a:p>
         </p:txBody>
@@ -8793,8 +8781,8 @@
         </p:nvSpPr>
         <p:spPr>
           <a:xfrm>
-            <a:off x="4476798" y="4536528"/>
-            <a:ext cx="844606" cy="597094"/>
+            <a:off x="3975503" y="4087738"/>
+            <a:ext cx="1363415" cy="337044"/>
           </a:xfrm>
           <a:prstGeom prst="rect">
             <a:avLst/>
@@ -8829,15 +8817,7 @@
             <a:pPr algn="ctr"/>
             <a:r>
               <a:rPr lang="es-CO" sz="1200" dirty="0"/>
-              <a:t>Security </a:t>
-            </a:r>
-            <a:r>
-              <a:rPr lang="es-CO" sz="1200" dirty="0" err="1"/>
-              <a:t>Group</a:t>
-            </a:r>
-            <a:r>
-              <a:rPr lang="es-CO" sz="1200" dirty="0"/>
-              <a:t> LAN</a:t>
+              <a:t>rSecurityGroupEc2Private</a:t>
             </a:r>
           </a:p>
         </p:txBody>
@@ -8921,7 +8901,7 @@
         </p:blipFill>
         <p:spPr>
           <a:xfrm>
-            <a:off x="1909704" y="2709678"/>
+            <a:off x="1741542" y="2709678"/>
             <a:ext cx="194925" cy="194925"/>
           </a:xfrm>
           <a:prstGeom prst="rect">
@@ -8960,7 +8940,7 @@
         </p:blipFill>
         <p:spPr>
           <a:xfrm>
-            <a:off x="1900137" y="3984060"/>
+            <a:off x="1731975" y="3984060"/>
             <a:ext cx="194925" cy="194925"/>
           </a:xfrm>
           <a:prstGeom prst="rect">
@@ -8999,7 +8979,7 @@
         </p:blipFill>
         <p:spPr>
           <a:xfrm>
-            <a:off x="1948310" y="5070089"/>
+            <a:off x="1780148" y="5070089"/>
             <a:ext cx="194925" cy="194925"/>
           </a:xfrm>
           <a:prstGeom prst="rect">
@@ -9116,7 +9096,7 @@
         </p:blipFill>
         <p:spPr>
           <a:xfrm>
-            <a:off x="3926570" y="4472587"/>
+            <a:off x="3779428" y="4472587"/>
             <a:ext cx="194925" cy="194925"/>
           </a:xfrm>
           <a:prstGeom prst="rect">
@@ -9155,7 +9135,7 @@
         </p:blipFill>
         <p:spPr>
           <a:xfrm>
-            <a:off x="3917401" y="2236654"/>
+            <a:off x="3770259" y="2236654"/>
             <a:ext cx="194925" cy="194925"/>
           </a:xfrm>
           <a:prstGeom prst="rect">
@@ -9194,7 +9174,7 @@
         </p:blipFill>
         <p:spPr>
           <a:xfrm>
-            <a:off x="4382767" y="2432766"/>
+            <a:off x="4036686" y="2367850"/>
             <a:ext cx="194925" cy="194925"/>
           </a:xfrm>
           <a:prstGeom prst="rect">
@@ -9233,7 +9213,7 @@
         </p:blipFill>
         <p:spPr>
           <a:xfrm>
-            <a:off x="4411566" y="4501257"/>
+            <a:off x="4264424" y="4501257"/>
             <a:ext cx="194925" cy="194925"/>
           </a:xfrm>
           <a:prstGeom prst="rect">
@@ -9475,6 +9455,221 @@
           </a:prstGeom>
         </p:spPr>
       </p:pic>
+      <p:sp>
+        <p:nvSpPr>
+          <p:cNvPr id="78" name="Rectángulo 77">
+            <a:extLst>
+              <a:ext uri="{FF2B5EF4-FFF2-40B4-BE49-F238E27FC236}">
+                <a16:creationId xmlns:a16="http://schemas.microsoft.com/office/drawing/2014/main" id="{BFD1FFE7-4AB9-4E91-B143-693F84D0456E}"/>
+              </a:ext>
+            </a:extLst>
+          </p:cNvPr>
+          <p:cNvSpPr/>
+          <p:nvPr/>
+        </p:nvSpPr>
+        <p:spPr>
+          <a:xfrm>
+            <a:off x="3969302" y="5244495"/>
+            <a:ext cx="1336913" cy="337044"/>
+          </a:xfrm>
+          <a:prstGeom prst="rect">
+            <a:avLst/>
+          </a:prstGeom>
+          <a:solidFill>
+            <a:schemeClr val="accent2"/>
+          </a:solidFill>
+          <a:ln>
+            <a:noFill/>
+          </a:ln>
+        </p:spPr>
+        <p:style>
+          <a:lnRef idx="2">
+            <a:schemeClr val="accent1">
+              <a:shade val="50000"/>
+            </a:schemeClr>
+          </a:lnRef>
+          <a:fillRef idx="1">
+            <a:schemeClr val="accent1"/>
+          </a:fillRef>
+          <a:effectRef idx="0">
+            <a:schemeClr val="accent1"/>
+          </a:effectRef>
+          <a:fontRef idx="minor">
+            <a:schemeClr val="lt1"/>
+          </a:fontRef>
+        </p:style>
+        <p:txBody>
+          <a:bodyPr rtlCol="0" anchor="ctr"/>
+          <a:lstStyle/>
+          <a:p>
+            <a:pPr algn="ctr"/>
+            <a:r>
+              <a:rPr lang="es-CO" sz="1200" dirty="0" err="1"/>
+              <a:t>rDBSecurityGroupsDBA</a:t>
+            </a:r>
+            <a:endParaRPr lang="es-CO" sz="1200" dirty="0"/>
+          </a:p>
+        </p:txBody>
+      </p:sp>
+      <p:sp>
+        <p:nvSpPr>
+          <p:cNvPr id="80" name="Rectángulo 79">
+            <a:extLst>
+              <a:ext uri="{FF2B5EF4-FFF2-40B4-BE49-F238E27FC236}">
+                <a16:creationId xmlns:a16="http://schemas.microsoft.com/office/drawing/2014/main" id="{AFE3DE1F-FD02-4BBE-9141-BA2C5EDC9BCA}"/>
+              </a:ext>
+            </a:extLst>
+          </p:cNvPr>
+          <p:cNvSpPr/>
+          <p:nvPr/>
+        </p:nvSpPr>
+        <p:spPr>
+          <a:xfrm>
+            <a:off x="3969277" y="6026950"/>
+            <a:ext cx="1336757" cy="337044"/>
+          </a:xfrm>
+          <a:prstGeom prst="rect">
+            <a:avLst/>
+          </a:prstGeom>
+          <a:solidFill>
+            <a:schemeClr val="accent2"/>
+          </a:solidFill>
+          <a:ln>
+            <a:noFill/>
+          </a:ln>
+        </p:spPr>
+        <p:style>
+          <a:lnRef idx="2">
+            <a:schemeClr val="accent1">
+              <a:shade val="50000"/>
+            </a:schemeClr>
+          </a:lnRef>
+          <a:fillRef idx="1">
+            <a:schemeClr val="accent1"/>
+          </a:fillRef>
+          <a:effectRef idx="0">
+            <a:schemeClr val="accent1"/>
+          </a:effectRef>
+          <a:fontRef idx="minor">
+            <a:schemeClr val="lt1"/>
+          </a:fontRef>
+        </p:style>
+        <p:txBody>
+          <a:bodyPr rtlCol="0" anchor="ctr"/>
+          <a:lstStyle/>
+          <a:p>
+            <a:pPr algn="ctr"/>
+            <a:r>
+              <a:rPr lang="es-CO" sz="1200" dirty="0" err="1"/>
+              <a:t>rSecurityGroupEKSEFS</a:t>
+            </a:r>
+            <a:endParaRPr lang="es-CO" sz="1200" dirty="0"/>
+          </a:p>
+        </p:txBody>
+      </p:sp>
+      <p:cxnSp>
+        <p:nvCxnSpPr>
+          <p:cNvPr id="85" name="Conector: angular 84">
+            <a:extLst>
+              <a:ext uri="{FF2B5EF4-FFF2-40B4-BE49-F238E27FC236}">
+                <a16:creationId xmlns:a16="http://schemas.microsoft.com/office/drawing/2014/main" id="{D00E566D-A383-4B39-935A-6979B799BE32}"/>
+              </a:ext>
+            </a:extLst>
+          </p:cNvPr>
+          <p:cNvCxnSpPr>
+            <a:cxnSpLocks/>
+            <a:stCxn id="103" idx="1"/>
+            <a:endCxn id="78" idx="3"/>
+          </p:cNvCxnSpPr>
+          <p:nvPr/>
+        </p:nvCxnSpPr>
+        <p:spPr>
+          <a:xfrm rot="10800000" flipV="1">
+            <a:off x="5306215" y="4828611"/>
+            <a:ext cx="698110" cy="584405"/>
+          </a:xfrm>
+          <a:prstGeom prst="bentConnector3">
+            <a:avLst>
+              <a:gd name="adj1" fmla="val 50000"/>
+            </a:avLst>
+          </a:prstGeom>
+          <a:ln w="57150">
+            <a:solidFill>
+              <a:schemeClr val="bg1"/>
+            </a:solidFill>
+            <a:tailEnd type="triangle"/>
+          </a:ln>
+        </p:spPr>
+        <p:style>
+          <a:lnRef idx="1">
+            <a:schemeClr val="accent1"/>
+          </a:lnRef>
+          <a:fillRef idx="0">
+            <a:schemeClr val="accent1"/>
+          </a:fillRef>
+          <a:effectRef idx="0">
+            <a:schemeClr val="accent1"/>
+          </a:effectRef>
+          <a:fontRef idx="minor">
+            <a:schemeClr val="tx1"/>
+          </a:fontRef>
+        </p:style>
+      </p:cxnSp>
+      <p:sp>
+        <p:nvSpPr>
+          <p:cNvPr id="102" name="Rectángulo 101">
+            <a:extLst>
+              <a:ext uri="{FF2B5EF4-FFF2-40B4-BE49-F238E27FC236}">
+                <a16:creationId xmlns:a16="http://schemas.microsoft.com/office/drawing/2014/main" id="{A0498A4B-77C6-4495-9E26-89957EF41AD1}"/>
+              </a:ext>
+            </a:extLst>
+          </p:cNvPr>
+          <p:cNvSpPr/>
+          <p:nvPr/>
+        </p:nvSpPr>
+        <p:spPr>
+          <a:xfrm>
+            <a:off x="4141176" y="2820939"/>
+            <a:ext cx="1295797" cy="337044"/>
+          </a:xfrm>
+          <a:prstGeom prst="rect">
+            <a:avLst/>
+          </a:prstGeom>
+          <a:solidFill>
+            <a:schemeClr val="accent2"/>
+          </a:solidFill>
+          <a:ln>
+            <a:noFill/>
+          </a:ln>
+        </p:spPr>
+        <p:style>
+          <a:lnRef idx="2">
+            <a:schemeClr val="accent1">
+              <a:shade val="50000"/>
+            </a:schemeClr>
+          </a:lnRef>
+          <a:fillRef idx="1">
+            <a:schemeClr val="accent1"/>
+          </a:fillRef>
+          <a:effectRef idx="0">
+            <a:schemeClr val="accent1"/>
+          </a:effectRef>
+          <a:fontRef idx="minor">
+            <a:schemeClr val="lt1"/>
+          </a:fontRef>
+        </p:style>
+        <p:txBody>
+          <a:bodyPr rtlCol="0" anchor="ctr"/>
+          <a:lstStyle/>
+          <a:p>
+            <a:pPr algn="ctr"/>
+            <a:r>
+              <a:rPr lang="es-CO" sz="1200" dirty="0"/>
+              <a:t>rSecurityGroupEc2Public</a:t>
+            </a:r>
+          </a:p>
+        </p:txBody>
+      </p:sp>
     </p:spTree>
     <p:extLst>
       <p:ext uri="{BB962C8B-B14F-4D97-AF65-F5344CB8AC3E}">
@@ -12946,6 +13141,2774 @@
     <p:extLst>
       <p:ext uri="{BB962C8B-B14F-4D97-AF65-F5344CB8AC3E}">
         <p14:creationId xmlns:p14="http://schemas.microsoft.com/office/powerpoint/2010/main" val="152562310"/>
+      </p:ext>
+    </p:extLst>
+  </p:cSld>
+  <p:clrMapOvr>
+    <a:masterClrMapping/>
+  </p:clrMapOvr>
+</p:sld>
+</file>
+
+<file path=ppt/slides/slide5.xml><?xml version="1.0" encoding="utf-8"?>
+<p:sld xmlns:a="http://schemas.openxmlformats.org/drawingml/2006/main" xmlns:r="http://schemas.openxmlformats.org/officeDocument/2006/relationships" xmlns:p="http://schemas.openxmlformats.org/presentationml/2006/main">
+  <p:cSld>
+    <p:bg>
+      <p:bgPr>
+        <a:solidFill>
+          <a:schemeClr val="tx1"/>
+        </a:solidFill>
+        <a:effectLst/>
+      </p:bgPr>
+    </p:bg>
+    <p:spTree>
+      <p:nvGrpSpPr>
+        <p:cNvPr id="1" name=""/>
+        <p:cNvGrpSpPr/>
+        <p:nvPr/>
+      </p:nvGrpSpPr>
+      <p:grpSpPr>
+        <a:xfrm>
+          <a:off x="0" y="0"/>
+          <a:ext cx="0" cy="0"/>
+          <a:chOff x="0" y="0"/>
+          <a:chExt cx="0" cy="0"/>
+        </a:xfrm>
+      </p:grpSpPr>
+      <p:sp>
+        <p:nvSpPr>
+          <p:cNvPr id="8" name="Rectángulo 7">
+            <a:extLst>
+              <a:ext uri="{FF2B5EF4-FFF2-40B4-BE49-F238E27FC236}">
+                <a16:creationId xmlns:a16="http://schemas.microsoft.com/office/drawing/2014/main" id="{EFADA991-BD95-4B69-B5F6-E0E2AF895DA0}"/>
+              </a:ext>
+            </a:extLst>
+          </p:cNvPr>
+          <p:cNvSpPr/>
+          <p:nvPr/>
+        </p:nvSpPr>
+        <p:spPr>
+          <a:xfrm>
+            <a:off x="6010914" y="2376430"/>
+            <a:ext cx="1079368" cy="712047"/>
+          </a:xfrm>
+          <a:prstGeom prst="rect">
+            <a:avLst/>
+          </a:prstGeom>
+          <a:solidFill>
+            <a:schemeClr val="accent2"/>
+          </a:solidFill>
+          <a:ln>
+            <a:noFill/>
+          </a:ln>
+        </p:spPr>
+        <p:style>
+          <a:lnRef idx="2">
+            <a:schemeClr val="accent1">
+              <a:shade val="50000"/>
+            </a:schemeClr>
+          </a:lnRef>
+          <a:fillRef idx="1">
+            <a:schemeClr val="accent1"/>
+          </a:fillRef>
+          <a:effectRef idx="0">
+            <a:schemeClr val="accent1"/>
+          </a:effectRef>
+          <a:fontRef idx="minor">
+            <a:schemeClr val="lt1"/>
+          </a:fontRef>
+        </p:style>
+        <p:txBody>
+          <a:bodyPr rtlCol="0" anchor="ctr"/>
+          <a:lstStyle/>
+          <a:p>
+            <a:pPr algn="ctr"/>
+            <a:r>
+              <a:rPr lang="es-CO" sz="1400" dirty="0"/>
+              <a:t>Network ACL</a:t>
+            </a:r>
+          </a:p>
+        </p:txBody>
+      </p:sp>
+      <p:cxnSp>
+        <p:nvCxnSpPr>
+          <p:cNvPr id="11" name="Conector: angular 10">
+            <a:extLst>
+              <a:ext uri="{FF2B5EF4-FFF2-40B4-BE49-F238E27FC236}">
+                <a16:creationId xmlns:a16="http://schemas.microsoft.com/office/drawing/2014/main" id="{60B58C33-366D-4271-B2FC-8101352823C4}"/>
+              </a:ext>
+            </a:extLst>
+          </p:cNvPr>
+          <p:cNvCxnSpPr>
+            <a:cxnSpLocks/>
+            <a:stCxn id="9222" idx="1"/>
+            <a:endCxn id="83" idx="3"/>
+          </p:cNvCxnSpPr>
+          <p:nvPr/>
+        </p:nvCxnSpPr>
+        <p:spPr>
+          <a:xfrm rot="10800000">
+            <a:off x="8340699" y="2732455"/>
+            <a:ext cx="659437" cy="920997"/>
+          </a:xfrm>
+          <a:prstGeom prst="bentConnector3">
+            <a:avLst>
+              <a:gd name="adj1" fmla="val 50000"/>
+            </a:avLst>
+          </a:prstGeom>
+          <a:ln w="57150">
+            <a:solidFill>
+              <a:schemeClr val="bg1"/>
+            </a:solidFill>
+            <a:tailEnd type="triangle"/>
+          </a:ln>
+        </p:spPr>
+        <p:style>
+          <a:lnRef idx="1">
+            <a:schemeClr val="accent1"/>
+          </a:lnRef>
+          <a:fillRef idx="0">
+            <a:schemeClr val="accent1"/>
+          </a:fillRef>
+          <a:effectRef idx="0">
+            <a:schemeClr val="accent1"/>
+          </a:effectRef>
+          <a:fontRef idx="minor">
+            <a:schemeClr val="tx1"/>
+          </a:fontRef>
+        </p:style>
+      </p:cxnSp>
+      <p:sp>
+        <p:nvSpPr>
+          <p:cNvPr id="14" name="CuadroTexto 13">
+            <a:extLst>
+              <a:ext uri="{FF2B5EF4-FFF2-40B4-BE49-F238E27FC236}">
+                <a16:creationId xmlns:a16="http://schemas.microsoft.com/office/drawing/2014/main" id="{BF44BC68-AAE1-451F-BBD7-D647FD5B796F}"/>
+              </a:ext>
+            </a:extLst>
+          </p:cNvPr>
+          <p:cNvSpPr txBox="1"/>
+          <p:nvPr/>
+        </p:nvSpPr>
+        <p:spPr>
+          <a:xfrm>
+            <a:off x="9112651" y="3887625"/>
+            <a:ext cx="762068" cy="338554"/>
+          </a:xfrm>
+          <a:prstGeom prst="rect">
+            <a:avLst/>
+          </a:prstGeom>
+          <a:noFill/>
+        </p:spPr>
+        <p:txBody>
+          <a:bodyPr wrap="none" rtlCol="0">
+            <a:spAutoFit/>
+          </a:bodyPr>
+          <a:lstStyle/>
+          <a:p>
+            <a:r>
+              <a:rPr lang="es-CO" sz="1600" b="1" dirty="0" err="1">
+                <a:solidFill>
+                  <a:schemeClr val="bg1"/>
+                </a:solidFill>
+              </a:rPr>
+              <a:t>Router</a:t>
+            </a:r>
+            <a:endParaRPr lang="es-CO" sz="1600" b="1" dirty="0">
+              <a:solidFill>
+                <a:schemeClr val="bg1"/>
+              </a:solidFill>
+            </a:endParaRPr>
+          </a:p>
+        </p:txBody>
+      </p:sp>
+      <p:sp>
+        <p:nvSpPr>
+          <p:cNvPr id="15" name="Rectángulo: esquinas redondeadas 14">
+            <a:extLst>
+              <a:ext uri="{FF2B5EF4-FFF2-40B4-BE49-F238E27FC236}">
+                <a16:creationId xmlns:a16="http://schemas.microsoft.com/office/drawing/2014/main" id="{4030F766-0B87-45F8-B2F2-D52570EB8E28}"/>
+              </a:ext>
+            </a:extLst>
+          </p:cNvPr>
+          <p:cNvSpPr/>
+          <p:nvPr/>
+        </p:nvSpPr>
+        <p:spPr>
+          <a:xfrm>
+            <a:off x="626985" y="1267968"/>
+            <a:ext cx="9934336" cy="5117827"/>
+          </a:xfrm>
+          <a:prstGeom prst="roundRect">
+            <a:avLst>
+              <a:gd name="adj" fmla="val 6621"/>
+            </a:avLst>
+          </a:prstGeom>
+          <a:noFill/>
+          <a:ln>
+            <a:solidFill>
+              <a:schemeClr val="accent4"/>
+            </a:solidFill>
+          </a:ln>
+        </p:spPr>
+        <p:style>
+          <a:lnRef idx="2">
+            <a:schemeClr val="accent1">
+              <a:shade val="50000"/>
+            </a:schemeClr>
+          </a:lnRef>
+          <a:fillRef idx="1">
+            <a:schemeClr val="accent1"/>
+          </a:fillRef>
+          <a:effectRef idx="0">
+            <a:schemeClr val="accent1"/>
+          </a:effectRef>
+          <a:fontRef idx="minor">
+            <a:schemeClr val="lt1"/>
+          </a:fontRef>
+        </p:style>
+        <p:txBody>
+          <a:bodyPr rtlCol="0" anchor="ctr"/>
+          <a:lstStyle/>
+          <a:p>
+            <a:pPr algn="ctr"/>
+            <a:endParaRPr lang="es-CO"/>
+          </a:p>
+        </p:txBody>
+      </p:sp>
+      <p:sp>
+        <p:nvSpPr>
+          <p:cNvPr id="16" name="Rectángulo: esquinas redondeadas 15">
+            <a:extLst>
+              <a:ext uri="{FF2B5EF4-FFF2-40B4-BE49-F238E27FC236}">
+                <a16:creationId xmlns:a16="http://schemas.microsoft.com/office/drawing/2014/main" id="{788A7DE6-C3C5-4C9E-8653-3C95F1AE7932}"/>
+              </a:ext>
+            </a:extLst>
+          </p:cNvPr>
+          <p:cNvSpPr/>
+          <p:nvPr/>
+        </p:nvSpPr>
+        <p:spPr>
+          <a:xfrm>
+            <a:off x="259081" y="902208"/>
+            <a:ext cx="10482226" cy="5809488"/>
+          </a:xfrm>
+          <a:prstGeom prst="roundRect">
+            <a:avLst>
+              <a:gd name="adj" fmla="val 6621"/>
+            </a:avLst>
+          </a:prstGeom>
+          <a:noFill/>
+          <a:ln>
+            <a:solidFill>
+              <a:schemeClr val="accent2"/>
+            </a:solidFill>
+          </a:ln>
+        </p:spPr>
+        <p:style>
+          <a:lnRef idx="2">
+            <a:schemeClr val="accent1">
+              <a:shade val="50000"/>
+            </a:schemeClr>
+          </a:lnRef>
+          <a:fillRef idx="1">
+            <a:schemeClr val="accent1"/>
+          </a:fillRef>
+          <a:effectRef idx="0">
+            <a:schemeClr val="accent1"/>
+          </a:effectRef>
+          <a:fontRef idx="minor">
+            <a:schemeClr val="lt1"/>
+          </a:fontRef>
+        </p:style>
+        <p:txBody>
+          <a:bodyPr rtlCol="0" anchor="ctr"/>
+          <a:lstStyle/>
+          <a:p>
+            <a:pPr algn="ctr"/>
+            <a:endParaRPr lang="es-CO"/>
+          </a:p>
+        </p:txBody>
+      </p:sp>
+      <p:pic>
+        <p:nvPicPr>
+          <p:cNvPr id="17" name="Picture 2" descr="Compute, copy, networking, vpc icon">
+            <a:extLst>
+              <a:ext uri="{FF2B5EF4-FFF2-40B4-BE49-F238E27FC236}">
+                <a16:creationId xmlns:a16="http://schemas.microsoft.com/office/drawing/2014/main" id="{E6E08D7A-9D5C-48BC-8654-0A15C6890D00}"/>
+              </a:ext>
+            </a:extLst>
+          </p:cNvPr>
+          <p:cNvPicPr>
+            <a:picLocks noChangeAspect="1" noChangeArrowheads="1"/>
+          </p:cNvPicPr>
+          <p:nvPr/>
+        </p:nvPicPr>
+        <p:blipFill>
+          <a:blip r:embed="rId3">
+            <a:extLst>
+              <a:ext uri="{28A0092B-C50C-407E-A947-70E740481C1C}">
+                <a14:useLocalDpi xmlns:a14="http://schemas.microsoft.com/office/drawing/2010/main" val="0"/>
+              </a:ext>
+            </a:extLst>
+          </a:blip>
+          <a:srcRect/>
+          <a:stretch>
+            <a:fillRect/>
+          </a:stretch>
+        </p:blipFill>
+        <p:spPr bwMode="auto">
+          <a:xfrm>
+            <a:off x="1119161" y="864368"/>
+            <a:ext cx="906463" cy="835523"/>
+          </a:xfrm>
+          <a:prstGeom prst="rect">
+            <a:avLst/>
+          </a:prstGeom>
+          <a:noFill/>
+          <a:extLst>
+            <a:ext uri="{909E8E84-426E-40DD-AFC4-6F175D3DCCD1}">
+              <a14:hiddenFill xmlns:a14="http://schemas.microsoft.com/office/drawing/2010/main">
+                <a:solidFill>
+                  <a:srgbClr val="FFFFFF"/>
+                </a:solidFill>
+              </a14:hiddenFill>
+            </a:ext>
+          </a:extLst>
+        </p:spPr>
+      </p:pic>
+      <p:sp>
+        <p:nvSpPr>
+          <p:cNvPr id="19" name="CuadroTexto 18">
+            <a:extLst>
+              <a:ext uri="{FF2B5EF4-FFF2-40B4-BE49-F238E27FC236}">
+                <a16:creationId xmlns:a16="http://schemas.microsoft.com/office/drawing/2014/main" id="{218E46EF-724E-4FE6-A38E-F2A6F4BBD446}"/>
+              </a:ext>
+            </a:extLst>
+          </p:cNvPr>
+          <p:cNvSpPr txBox="1"/>
+          <p:nvPr/>
+        </p:nvSpPr>
+        <p:spPr>
+          <a:xfrm>
+            <a:off x="477616" y="6385795"/>
+            <a:ext cx="1678023" cy="338554"/>
+          </a:xfrm>
+          <a:prstGeom prst="rect">
+            <a:avLst/>
+          </a:prstGeom>
+          <a:noFill/>
+        </p:spPr>
+        <p:txBody>
+          <a:bodyPr wrap="none" rtlCol="0">
+            <a:spAutoFit/>
+          </a:bodyPr>
+          <a:lstStyle/>
+          <a:p>
+            <a:r>
+              <a:rPr lang="es-CO" sz="1600" dirty="0">
+                <a:solidFill>
+                  <a:schemeClr val="bg1"/>
+                </a:solidFill>
+              </a:rPr>
+              <a:t>REGION (</a:t>
+            </a:r>
+            <a:r>
+              <a:rPr lang="es-CO" sz="1600" dirty="0" err="1">
+                <a:solidFill>
+                  <a:schemeClr val="bg1"/>
+                </a:solidFill>
+              </a:rPr>
+              <a:t>nvirgnia</a:t>
+            </a:r>
+            <a:r>
+              <a:rPr lang="es-CO" sz="1600" dirty="0">
+                <a:solidFill>
+                  <a:schemeClr val="bg1"/>
+                </a:solidFill>
+              </a:rPr>
+              <a:t>)</a:t>
+            </a:r>
+          </a:p>
+        </p:txBody>
+      </p:sp>
+      <p:sp>
+        <p:nvSpPr>
+          <p:cNvPr id="75" name="Rectángulo: esquinas redondeadas 74">
+            <a:extLst>
+              <a:ext uri="{FF2B5EF4-FFF2-40B4-BE49-F238E27FC236}">
+                <a16:creationId xmlns:a16="http://schemas.microsoft.com/office/drawing/2014/main" id="{E7E7533B-3077-4091-BB38-9D8FB7870915}"/>
+              </a:ext>
+            </a:extLst>
+          </p:cNvPr>
+          <p:cNvSpPr/>
+          <p:nvPr/>
+        </p:nvSpPr>
+        <p:spPr>
+          <a:xfrm>
+            <a:off x="1545681" y="1835846"/>
+            <a:ext cx="3947817" cy="712047"/>
+          </a:xfrm>
+          <a:prstGeom prst="roundRect">
+            <a:avLst>
+              <a:gd name="adj" fmla="val 15940"/>
+            </a:avLst>
+          </a:prstGeom>
+          <a:noFill/>
+          <a:ln w="19050">
+            <a:solidFill>
+              <a:schemeClr val="accent4"/>
+            </a:solidFill>
+          </a:ln>
+        </p:spPr>
+        <p:style>
+          <a:lnRef idx="2">
+            <a:schemeClr val="accent1">
+              <a:shade val="50000"/>
+            </a:schemeClr>
+          </a:lnRef>
+          <a:fillRef idx="1">
+            <a:schemeClr val="accent1"/>
+          </a:fillRef>
+          <a:effectRef idx="0">
+            <a:schemeClr val="accent1"/>
+          </a:effectRef>
+          <a:fontRef idx="minor">
+            <a:schemeClr val="lt1"/>
+          </a:fontRef>
+        </p:style>
+        <p:txBody>
+          <a:bodyPr rtlCol="0" anchor="ctr"/>
+          <a:lstStyle/>
+          <a:p>
+            <a:pPr algn="ctr"/>
+            <a:endParaRPr lang="es-CO"/>
+          </a:p>
+        </p:txBody>
+      </p:sp>
+      <p:sp>
+        <p:nvSpPr>
+          <p:cNvPr id="77" name="Rectángulo: esquinas redondeadas 76">
+            <a:extLst>
+              <a:ext uri="{FF2B5EF4-FFF2-40B4-BE49-F238E27FC236}">
+                <a16:creationId xmlns:a16="http://schemas.microsoft.com/office/drawing/2014/main" id="{2CFE5870-B99A-48BE-BE48-DF2FD4129F6C}"/>
+              </a:ext>
+            </a:extLst>
+          </p:cNvPr>
+          <p:cNvSpPr/>
+          <p:nvPr/>
+        </p:nvSpPr>
+        <p:spPr>
+          <a:xfrm>
+            <a:off x="1553852" y="4926477"/>
+            <a:ext cx="3971908" cy="947735"/>
+          </a:xfrm>
+          <a:prstGeom prst="roundRect">
+            <a:avLst>
+              <a:gd name="adj" fmla="val 15940"/>
+            </a:avLst>
+          </a:prstGeom>
+          <a:noFill/>
+          <a:ln w="19050">
+            <a:solidFill>
+              <a:schemeClr val="accent4"/>
+            </a:solidFill>
+          </a:ln>
+        </p:spPr>
+        <p:style>
+          <a:lnRef idx="2">
+            <a:schemeClr val="accent1">
+              <a:shade val="50000"/>
+            </a:schemeClr>
+          </a:lnRef>
+          <a:fillRef idx="1">
+            <a:schemeClr val="accent1"/>
+          </a:fillRef>
+          <a:effectRef idx="0">
+            <a:schemeClr val="accent1"/>
+          </a:effectRef>
+          <a:fontRef idx="minor">
+            <a:schemeClr val="lt1"/>
+          </a:fontRef>
+        </p:style>
+        <p:txBody>
+          <a:bodyPr rtlCol="0" anchor="ctr"/>
+          <a:lstStyle/>
+          <a:p>
+            <a:pPr algn="ctr"/>
+            <a:endParaRPr lang="es-CO" dirty="0"/>
+          </a:p>
+        </p:txBody>
+      </p:sp>
+      <p:pic>
+        <p:nvPicPr>
+          <p:cNvPr id="9218" name="Picture 2" descr="Compute, copy, gateway, internet, networking, vpc icon">
+            <a:extLst>
+              <a:ext uri="{FF2B5EF4-FFF2-40B4-BE49-F238E27FC236}">
+                <a16:creationId xmlns:a16="http://schemas.microsoft.com/office/drawing/2014/main" id="{1E0822B6-37F6-4950-B740-B2A3C1A10317}"/>
+              </a:ext>
+            </a:extLst>
+          </p:cNvPr>
+          <p:cNvPicPr>
+            <a:picLocks noChangeAspect="1" noChangeArrowheads="1"/>
+          </p:cNvPicPr>
+          <p:nvPr/>
+        </p:nvPicPr>
+        <p:blipFill>
+          <a:blip r:embed="rId4">
+            <a:extLst>
+              <a:ext uri="{28A0092B-C50C-407E-A947-70E740481C1C}">
+                <a14:useLocalDpi xmlns:a14="http://schemas.microsoft.com/office/drawing/2010/main" val="0"/>
+              </a:ext>
+            </a:extLst>
+          </a:blip>
+          <a:srcRect/>
+          <a:stretch>
+            <a:fillRect/>
+          </a:stretch>
+        </p:blipFill>
+        <p:spPr bwMode="auto">
+          <a:xfrm>
+            <a:off x="10247704" y="3197170"/>
+            <a:ext cx="939667" cy="939667"/>
+          </a:xfrm>
+          <a:prstGeom prst="rect">
+            <a:avLst/>
+          </a:prstGeom>
+          <a:noFill/>
+          <a:extLst>
+            <a:ext uri="{909E8E84-426E-40DD-AFC4-6F175D3DCCD1}">
+              <a14:hiddenFill xmlns:a14="http://schemas.microsoft.com/office/drawing/2010/main">
+                <a:solidFill>
+                  <a:srgbClr val="FFFFFF"/>
+                </a:solidFill>
+              </a14:hiddenFill>
+            </a:ext>
+          </a:extLst>
+        </p:spPr>
+      </p:pic>
+      <p:cxnSp>
+        <p:nvCxnSpPr>
+          <p:cNvPr id="92" name="Conector recto de flecha 91">
+            <a:extLst>
+              <a:ext uri="{FF2B5EF4-FFF2-40B4-BE49-F238E27FC236}">
+                <a16:creationId xmlns:a16="http://schemas.microsoft.com/office/drawing/2014/main" id="{2558741D-4B18-427F-8F69-71CD31435C56}"/>
+              </a:ext>
+            </a:extLst>
+          </p:cNvPr>
+          <p:cNvCxnSpPr>
+            <a:cxnSpLocks/>
+            <a:stCxn id="9218" idx="1"/>
+            <a:endCxn id="9222" idx="3"/>
+          </p:cNvCxnSpPr>
+          <p:nvPr/>
+        </p:nvCxnSpPr>
+        <p:spPr>
+          <a:xfrm flipH="1" flipV="1">
+            <a:off x="9939802" y="3653451"/>
+            <a:ext cx="307902" cy="13553"/>
+          </a:xfrm>
+          <a:prstGeom prst="straightConnector1">
+            <a:avLst/>
+          </a:prstGeom>
+          <a:ln w="57150">
+            <a:solidFill>
+              <a:schemeClr val="bg1"/>
+            </a:solidFill>
+            <a:tailEnd type="triangle"/>
+          </a:ln>
+        </p:spPr>
+        <p:style>
+          <a:lnRef idx="1">
+            <a:schemeClr val="accent1"/>
+          </a:lnRef>
+          <a:fillRef idx="0">
+            <a:schemeClr val="accent1"/>
+          </a:fillRef>
+          <a:effectRef idx="0">
+            <a:schemeClr val="accent1"/>
+          </a:effectRef>
+          <a:fontRef idx="minor">
+            <a:schemeClr val="tx1"/>
+          </a:fontRef>
+        </p:style>
+      </p:cxnSp>
+      <p:pic>
+        <p:nvPicPr>
+          <p:cNvPr id="9222" name="Picture 6" descr="Compute, copy, networking, router, vpc icon">
+            <a:extLst>
+              <a:ext uri="{FF2B5EF4-FFF2-40B4-BE49-F238E27FC236}">
+                <a16:creationId xmlns:a16="http://schemas.microsoft.com/office/drawing/2014/main" id="{FDB02863-FEAB-433B-93D1-B6F3CBB718B8}"/>
+              </a:ext>
+            </a:extLst>
+          </p:cNvPr>
+          <p:cNvPicPr>
+            <a:picLocks noChangeAspect="1" noChangeArrowheads="1"/>
+          </p:cNvPicPr>
+          <p:nvPr/>
+        </p:nvPicPr>
+        <p:blipFill>
+          <a:blip r:embed="rId5">
+            <a:extLst>
+              <a:ext uri="{28A0092B-C50C-407E-A947-70E740481C1C}">
+                <a14:useLocalDpi xmlns:a14="http://schemas.microsoft.com/office/drawing/2010/main" val="0"/>
+              </a:ext>
+            </a:extLst>
+          </a:blip>
+          <a:srcRect/>
+          <a:stretch>
+            <a:fillRect/>
+          </a:stretch>
+        </p:blipFill>
+        <p:spPr bwMode="auto">
+          <a:xfrm>
+            <a:off x="9000135" y="3183617"/>
+            <a:ext cx="939667" cy="939667"/>
+          </a:xfrm>
+          <a:prstGeom prst="rect">
+            <a:avLst/>
+          </a:prstGeom>
+          <a:noFill/>
+          <a:extLst>
+            <a:ext uri="{909E8E84-426E-40DD-AFC4-6F175D3DCCD1}">
+              <a14:hiddenFill xmlns:a14="http://schemas.microsoft.com/office/drawing/2010/main">
+                <a:solidFill>
+                  <a:srgbClr val="FFFFFF"/>
+                </a:solidFill>
+              </a14:hiddenFill>
+            </a:ext>
+          </a:extLst>
+        </p:spPr>
+      </p:pic>
+      <p:sp>
+        <p:nvSpPr>
+          <p:cNvPr id="108" name="CuadroTexto 107">
+            <a:extLst>
+              <a:ext uri="{FF2B5EF4-FFF2-40B4-BE49-F238E27FC236}">
+                <a16:creationId xmlns:a16="http://schemas.microsoft.com/office/drawing/2014/main" id="{BE86AED2-BB36-4925-A15A-3267E437A8F5}"/>
+              </a:ext>
+            </a:extLst>
+          </p:cNvPr>
+          <p:cNvSpPr txBox="1"/>
+          <p:nvPr/>
+        </p:nvSpPr>
+        <p:spPr>
+          <a:xfrm>
+            <a:off x="626984" y="304809"/>
+            <a:ext cx="5157246" cy="523220"/>
+          </a:xfrm>
+          <a:prstGeom prst="rect">
+            <a:avLst/>
+          </a:prstGeom>
+          <a:noFill/>
+        </p:spPr>
+        <p:txBody>
+          <a:bodyPr wrap="none" rtlCol="0">
+            <a:spAutoFit/>
+          </a:bodyPr>
+          <a:lstStyle/>
+          <a:p>
+            <a:pPr algn="ctr"/>
+            <a:r>
+              <a:rPr lang="es-CO" sz="2800" dirty="0">
+                <a:solidFill>
+                  <a:schemeClr val="bg1"/>
+                </a:solidFill>
+              </a:rPr>
+              <a:t>VPC </a:t>
+            </a:r>
+            <a:r>
+              <a:rPr lang="es-CO" sz="2800" dirty="0" err="1">
+                <a:solidFill>
+                  <a:schemeClr val="bg1"/>
+                </a:solidFill>
+              </a:rPr>
+              <a:t>with</a:t>
+            </a:r>
+            <a:r>
+              <a:rPr lang="es-CO" sz="2800" dirty="0">
+                <a:solidFill>
+                  <a:schemeClr val="bg1"/>
+                </a:solidFill>
+              </a:rPr>
+              <a:t> </a:t>
+            </a:r>
+            <a:r>
+              <a:rPr lang="es-CO" sz="2800" dirty="0" err="1">
+                <a:solidFill>
+                  <a:schemeClr val="bg1"/>
+                </a:solidFill>
+              </a:rPr>
+              <a:t>Public</a:t>
+            </a:r>
+            <a:r>
+              <a:rPr lang="es-CO" sz="2800" dirty="0">
+                <a:solidFill>
+                  <a:schemeClr val="bg1"/>
+                </a:solidFill>
+              </a:rPr>
+              <a:t> &amp; </a:t>
+            </a:r>
+            <a:r>
+              <a:rPr lang="es-CO" sz="2800" dirty="0" err="1">
+                <a:solidFill>
+                  <a:schemeClr val="bg1"/>
+                </a:solidFill>
+              </a:rPr>
+              <a:t>Private</a:t>
+            </a:r>
+            <a:r>
+              <a:rPr lang="es-CO" sz="2800" dirty="0">
+                <a:solidFill>
+                  <a:schemeClr val="bg1"/>
+                </a:solidFill>
+              </a:rPr>
+              <a:t> </a:t>
+            </a:r>
+            <a:r>
+              <a:rPr lang="es-CO" sz="2800" dirty="0" err="1">
+                <a:solidFill>
+                  <a:schemeClr val="bg1"/>
+                </a:solidFill>
+              </a:rPr>
+              <a:t>Sunet</a:t>
+            </a:r>
+            <a:r>
+              <a:rPr lang="es-CO" sz="2800" dirty="0">
+                <a:solidFill>
+                  <a:schemeClr val="bg1"/>
+                </a:solidFill>
+              </a:rPr>
+              <a:t>(s)</a:t>
+            </a:r>
+          </a:p>
+        </p:txBody>
+      </p:sp>
+      <p:sp>
+        <p:nvSpPr>
+          <p:cNvPr id="109" name="CuadroTexto 108">
+            <a:extLst>
+              <a:ext uri="{FF2B5EF4-FFF2-40B4-BE49-F238E27FC236}">
+                <a16:creationId xmlns:a16="http://schemas.microsoft.com/office/drawing/2014/main" id="{35FCD6AB-4DAA-4487-8A9B-8D4A88B8F8AE}"/>
+              </a:ext>
+            </a:extLst>
+          </p:cNvPr>
+          <p:cNvSpPr txBox="1"/>
+          <p:nvPr/>
+        </p:nvSpPr>
+        <p:spPr>
+          <a:xfrm>
+            <a:off x="11019198" y="3334532"/>
+            <a:ext cx="1005403" cy="754053"/>
+          </a:xfrm>
+          <a:prstGeom prst="rect">
+            <a:avLst/>
+          </a:prstGeom>
+          <a:noFill/>
+        </p:spPr>
+        <p:txBody>
+          <a:bodyPr wrap="none" rtlCol="0">
+            <a:spAutoFit/>
+          </a:bodyPr>
+          <a:lstStyle/>
+          <a:p>
+            <a:r>
+              <a:rPr lang="es-CO" sz="1600" b="1" dirty="0">
+                <a:solidFill>
+                  <a:schemeClr val="bg1"/>
+                </a:solidFill>
+              </a:rPr>
+              <a:t>Internet </a:t>
+            </a:r>
+          </a:p>
+          <a:p>
+            <a:r>
+              <a:rPr lang="es-CO" sz="1600" b="1" dirty="0">
+                <a:solidFill>
+                  <a:schemeClr val="bg1"/>
+                </a:solidFill>
+              </a:rPr>
+              <a:t>Gateway</a:t>
+            </a:r>
+          </a:p>
+          <a:p>
+            <a:r>
+              <a:rPr lang="es-CO" sz="1050" dirty="0">
+                <a:solidFill>
+                  <a:schemeClr val="bg1"/>
+                </a:solidFill>
+                <a:hlinkClick r:id="rId6">
+                  <a:extLst>
+                    <a:ext uri="{A12FA001-AC4F-418D-AE19-62706E023703}">
+                      <ahyp:hlinkClr xmlns:ahyp="http://schemas.microsoft.com/office/drawing/2018/hyperlinkcolor" val="tx"/>
+                    </a:ext>
+                  </a:extLst>
+                </a:hlinkClick>
+              </a:rPr>
+              <a:t>igw-3d004655</a:t>
+            </a:r>
+            <a:endParaRPr lang="es-CO" sz="1600" b="1" dirty="0">
+              <a:solidFill>
+                <a:schemeClr val="bg1"/>
+              </a:solidFill>
+            </a:endParaRPr>
+          </a:p>
+        </p:txBody>
+      </p:sp>
+      <p:sp>
+        <p:nvSpPr>
+          <p:cNvPr id="45" name="CuadroTexto 44">
+            <a:extLst>
+              <a:ext uri="{FF2B5EF4-FFF2-40B4-BE49-F238E27FC236}">
+                <a16:creationId xmlns:a16="http://schemas.microsoft.com/office/drawing/2014/main" id="{E1EE2736-D278-4E4D-9CBA-AA26A896BC28}"/>
+              </a:ext>
+            </a:extLst>
+          </p:cNvPr>
+          <p:cNvSpPr txBox="1"/>
+          <p:nvPr/>
+        </p:nvSpPr>
+        <p:spPr>
+          <a:xfrm>
+            <a:off x="8143163" y="276778"/>
+            <a:ext cx="4050661" cy="523220"/>
+          </a:xfrm>
+          <a:prstGeom prst="rect">
+            <a:avLst/>
+          </a:prstGeom>
+          <a:noFill/>
+        </p:spPr>
+        <p:txBody>
+          <a:bodyPr wrap="none" rtlCol="0">
+            <a:spAutoFit/>
+          </a:bodyPr>
+          <a:lstStyle/>
+          <a:p>
+            <a:r>
+              <a:rPr lang="es-CO" sz="2800" dirty="0">
+                <a:solidFill>
+                  <a:schemeClr val="bg1"/>
+                </a:solidFill>
+              </a:rPr>
+              <a:t>RED PERSONALIZADA AWS</a:t>
+            </a:r>
+          </a:p>
+        </p:txBody>
+      </p:sp>
+      <p:sp>
+        <p:nvSpPr>
+          <p:cNvPr id="52" name="Rectángulo 51">
+            <a:extLst>
+              <a:ext uri="{FF2B5EF4-FFF2-40B4-BE49-F238E27FC236}">
+                <a16:creationId xmlns:a16="http://schemas.microsoft.com/office/drawing/2014/main" id="{A544E794-B14F-4F44-A688-6C6BA3A4FFF5}"/>
+              </a:ext>
+            </a:extLst>
+          </p:cNvPr>
+          <p:cNvSpPr/>
+          <p:nvPr/>
+        </p:nvSpPr>
+        <p:spPr>
+          <a:xfrm>
+            <a:off x="8818990" y="4177248"/>
+            <a:ext cx="1301959" cy="307777"/>
+          </a:xfrm>
+          <a:prstGeom prst="rect">
+            <a:avLst/>
+          </a:prstGeom>
+        </p:spPr>
+        <p:txBody>
+          <a:bodyPr wrap="none">
+            <a:spAutoFit/>
+          </a:bodyPr>
+          <a:lstStyle/>
+          <a:p>
+            <a:r>
+              <a:rPr lang="es-CO" sz="1400" dirty="0">
+                <a:solidFill>
+                  <a:schemeClr val="bg1"/>
+                </a:solidFill>
+              </a:rPr>
+              <a:t>192.168.0.0/16</a:t>
+            </a:r>
+            <a:endParaRPr lang="es-CO" sz="1400" dirty="0"/>
+          </a:p>
+        </p:txBody>
+      </p:sp>
+      <p:sp>
+        <p:nvSpPr>
+          <p:cNvPr id="53" name="CuadroTexto 52">
+            <a:extLst>
+              <a:ext uri="{FF2B5EF4-FFF2-40B4-BE49-F238E27FC236}">
+                <a16:creationId xmlns:a16="http://schemas.microsoft.com/office/drawing/2014/main" id="{A2E91C57-6B86-4A48-A142-E40BBC223858}"/>
+              </a:ext>
+            </a:extLst>
+          </p:cNvPr>
+          <p:cNvSpPr txBox="1"/>
+          <p:nvPr/>
+        </p:nvSpPr>
+        <p:spPr>
+          <a:xfrm>
+            <a:off x="7380709" y="5726978"/>
+            <a:ext cx="2885534" cy="400110"/>
+          </a:xfrm>
+          <a:prstGeom prst="rect">
+            <a:avLst/>
+          </a:prstGeom>
+          <a:noFill/>
+        </p:spPr>
+        <p:txBody>
+          <a:bodyPr wrap="none" rtlCol="0">
+            <a:spAutoFit/>
+          </a:bodyPr>
+          <a:lstStyle/>
+          <a:p>
+            <a:r>
+              <a:rPr lang="es-CO" sz="2000" dirty="0">
+                <a:solidFill>
+                  <a:schemeClr val="bg1"/>
+                </a:solidFill>
+              </a:rPr>
+              <a:t>DHCP: </a:t>
+            </a:r>
+            <a:r>
+              <a:rPr lang="es-CO" dirty="0" err="1">
+                <a:solidFill>
+                  <a:schemeClr val="bg1"/>
+                </a:solidFill>
+              </a:rPr>
+              <a:t>AmazonProvidedDNS</a:t>
+            </a:r>
+            <a:endParaRPr lang="es-CO" sz="2000" dirty="0">
+              <a:solidFill>
+                <a:schemeClr val="bg1"/>
+              </a:solidFill>
+            </a:endParaRPr>
+          </a:p>
+        </p:txBody>
+      </p:sp>
+      <p:sp>
+        <p:nvSpPr>
+          <p:cNvPr id="55" name="CuadroTexto 54">
+            <a:extLst>
+              <a:ext uri="{FF2B5EF4-FFF2-40B4-BE49-F238E27FC236}">
+                <a16:creationId xmlns:a16="http://schemas.microsoft.com/office/drawing/2014/main" id="{27F4AF41-FD00-40EB-8AB2-82C15967A55C}"/>
+              </a:ext>
+            </a:extLst>
+          </p:cNvPr>
+          <p:cNvSpPr txBox="1"/>
+          <p:nvPr/>
+        </p:nvSpPr>
+        <p:spPr>
+          <a:xfrm>
+            <a:off x="828653" y="5995675"/>
+            <a:ext cx="3150799" cy="338554"/>
+          </a:xfrm>
+          <a:prstGeom prst="rect">
+            <a:avLst/>
+          </a:prstGeom>
+          <a:noFill/>
+        </p:spPr>
+        <p:txBody>
+          <a:bodyPr wrap="none" rtlCol="0">
+            <a:spAutoFit/>
+          </a:bodyPr>
+          <a:lstStyle/>
+          <a:p>
+            <a:r>
+              <a:rPr lang="es-CO" sz="1600" dirty="0">
+                <a:solidFill>
+                  <a:schemeClr val="bg1"/>
+                </a:solidFill>
+              </a:rPr>
+              <a:t>VPC:  </a:t>
+            </a:r>
+            <a:r>
+              <a:rPr lang="es-CO" sz="1600" dirty="0">
+                <a:solidFill>
+                  <a:schemeClr val="bg1"/>
+                </a:solidFill>
+                <a:latin typeface="Calibri" panose="020F0502020204030204" pitchFamily="34" charset="0"/>
+              </a:rPr>
+              <a:t>aw1205-mft – 192.168.0.0/16</a:t>
+            </a:r>
+            <a:endParaRPr lang="es-CO" sz="1600" dirty="0">
+              <a:solidFill>
+                <a:schemeClr val="bg1"/>
+              </a:solidFill>
+            </a:endParaRPr>
+          </a:p>
+        </p:txBody>
+      </p:sp>
+      <p:sp>
+        <p:nvSpPr>
+          <p:cNvPr id="76" name="Rectángulo: esquinas redondeadas 75">
+            <a:extLst>
+              <a:ext uri="{FF2B5EF4-FFF2-40B4-BE49-F238E27FC236}">
+                <a16:creationId xmlns:a16="http://schemas.microsoft.com/office/drawing/2014/main" id="{5CA4B039-F9C6-4FD5-BA44-CE5CCE643BFB}"/>
+              </a:ext>
+            </a:extLst>
+          </p:cNvPr>
+          <p:cNvSpPr/>
+          <p:nvPr/>
+        </p:nvSpPr>
+        <p:spPr>
+          <a:xfrm>
+            <a:off x="1532516" y="3881013"/>
+            <a:ext cx="3971908" cy="947735"/>
+          </a:xfrm>
+          <a:prstGeom prst="roundRect">
+            <a:avLst>
+              <a:gd name="adj" fmla="val 15940"/>
+            </a:avLst>
+          </a:prstGeom>
+          <a:noFill/>
+          <a:ln w="19050">
+            <a:solidFill>
+              <a:schemeClr val="accent4"/>
+            </a:solidFill>
+          </a:ln>
+        </p:spPr>
+        <p:style>
+          <a:lnRef idx="2">
+            <a:schemeClr val="accent1">
+              <a:shade val="50000"/>
+            </a:schemeClr>
+          </a:lnRef>
+          <a:fillRef idx="1">
+            <a:schemeClr val="accent1"/>
+          </a:fillRef>
+          <a:effectRef idx="0">
+            <a:schemeClr val="accent1"/>
+          </a:effectRef>
+          <a:fontRef idx="minor">
+            <a:schemeClr val="lt1"/>
+          </a:fontRef>
+        </p:style>
+        <p:txBody>
+          <a:bodyPr rtlCol="0" anchor="ctr"/>
+          <a:lstStyle/>
+          <a:p>
+            <a:pPr algn="ctr"/>
+            <a:endParaRPr lang="es-CO" dirty="0"/>
+          </a:p>
+        </p:txBody>
+      </p:sp>
+      <p:sp>
+        <p:nvSpPr>
+          <p:cNvPr id="83" name="Rectángulo 82">
+            <a:extLst>
+              <a:ext uri="{FF2B5EF4-FFF2-40B4-BE49-F238E27FC236}">
+                <a16:creationId xmlns:a16="http://schemas.microsoft.com/office/drawing/2014/main" id="{B6AC232A-5721-41FE-990B-BD53B0FCD362}"/>
+              </a:ext>
+            </a:extLst>
+          </p:cNvPr>
+          <p:cNvSpPr/>
+          <p:nvPr/>
+        </p:nvSpPr>
+        <p:spPr>
+          <a:xfrm>
+            <a:off x="7434235" y="2359058"/>
+            <a:ext cx="906463" cy="746792"/>
+          </a:xfrm>
+          <a:prstGeom prst="rect">
+            <a:avLst/>
+          </a:prstGeom>
+          <a:solidFill>
+            <a:schemeClr val="accent2"/>
+          </a:solidFill>
+          <a:ln>
+            <a:noFill/>
+          </a:ln>
+        </p:spPr>
+        <p:style>
+          <a:lnRef idx="2">
+            <a:schemeClr val="accent1">
+              <a:shade val="50000"/>
+            </a:schemeClr>
+          </a:lnRef>
+          <a:fillRef idx="1">
+            <a:schemeClr val="accent1"/>
+          </a:fillRef>
+          <a:effectRef idx="0">
+            <a:schemeClr val="accent1"/>
+          </a:effectRef>
+          <a:fontRef idx="minor">
+            <a:schemeClr val="lt1"/>
+          </a:fontRef>
+        </p:style>
+        <p:txBody>
+          <a:bodyPr rtlCol="0" anchor="ctr"/>
+          <a:lstStyle/>
+          <a:p>
+            <a:pPr algn="ctr"/>
+            <a:r>
+              <a:rPr lang="es-CO" sz="1400" dirty="0" err="1"/>
+              <a:t>Route</a:t>
+            </a:r>
+            <a:r>
+              <a:rPr lang="es-CO" sz="1400" dirty="0"/>
+              <a:t> Table</a:t>
+            </a:r>
+          </a:p>
+        </p:txBody>
+      </p:sp>
+      <p:cxnSp>
+        <p:nvCxnSpPr>
+          <p:cNvPr id="84" name="Conector recto de flecha 83">
+            <a:extLst>
+              <a:ext uri="{FF2B5EF4-FFF2-40B4-BE49-F238E27FC236}">
+                <a16:creationId xmlns:a16="http://schemas.microsoft.com/office/drawing/2014/main" id="{B6527195-1410-432E-9CF8-1B2F597A718A}"/>
+              </a:ext>
+            </a:extLst>
+          </p:cNvPr>
+          <p:cNvCxnSpPr>
+            <a:cxnSpLocks/>
+            <a:stCxn id="83" idx="1"/>
+            <a:endCxn id="8" idx="3"/>
+          </p:cNvCxnSpPr>
+          <p:nvPr/>
+        </p:nvCxnSpPr>
+        <p:spPr>
+          <a:xfrm flipH="1">
+            <a:off x="7090282" y="2732454"/>
+            <a:ext cx="343953" cy="0"/>
+          </a:xfrm>
+          <a:prstGeom prst="straightConnector1">
+            <a:avLst/>
+          </a:prstGeom>
+          <a:ln w="57150">
+            <a:solidFill>
+              <a:schemeClr val="bg1"/>
+            </a:solidFill>
+            <a:tailEnd type="triangle"/>
+          </a:ln>
+        </p:spPr>
+        <p:style>
+          <a:lnRef idx="1">
+            <a:schemeClr val="accent1"/>
+          </a:lnRef>
+          <a:fillRef idx="0">
+            <a:schemeClr val="accent1"/>
+          </a:fillRef>
+          <a:effectRef idx="0">
+            <a:schemeClr val="accent1"/>
+          </a:effectRef>
+          <a:fontRef idx="minor">
+            <a:schemeClr val="tx1"/>
+          </a:fontRef>
+        </p:style>
+      </p:cxnSp>
+      <p:sp>
+        <p:nvSpPr>
+          <p:cNvPr id="86" name="Rectángulo: esquinas redondeadas 85">
+            <a:extLst>
+              <a:ext uri="{FF2B5EF4-FFF2-40B4-BE49-F238E27FC236}">
+                <a16:creationId xmlns:a16="http://schemas.microsoft.com/office/drawing/2014/main" id="{70A76B90-77D8-4DBD-B3C4-64C7B5302D92}"/>
+              </a:ext>
+            </a:extLst>
+          </p:cNvPr>
+          <p:cNvSpPr/>
+          <p:nvPr/>
+        </p:nvSpPr>
+        <p:spPr>
+          <a:xfrm>
+            <a:off x="1524426" y="2664781"/>
+            <a:ext cx="3976189" cy="808623"/>
+          </a:xfrm>
+          <a:prstGeom prst="roundRect">
+            <a:avLst>
+              <a:gd name="adj" fmla="val 15940"/>
+            </a:avLst>
+          </a:prstGeom>
+          <a:noFill/>
+          <a:ln w="19050">
+            <a:solidFill>
+              <a:schemeClr val="accent4"/>
+            </a:solidFill>
+          </a:ln>
+        </p:spPr>
+        <p:style>
+          <a:lnRef idx="2">
+            <a:schemeClr val="accent1">
+              <a:shade val="50000"/>
+            </a:schemeClr>
+          </a:lnRef>
+          <a:fillRef idx="1">
+            <a:schemeClr val="accent1"/>
+          </a:fillRef>
+          <a:effectRef idx="0">
+            <a:schemeClr val="accent1"/>
+          </a:effectRef>
+          <a:fontRef idx="minor">
+            <a:schemeClr val="lt1"/>
+          </a:fontRef>
+        </p:style>
+        <p:txBody>
+          <a:bodyPr rtlCol="0" anchor="ctr"/>
+          <a:lstStyle/>
+          <a:p>
+            <a:pPr algn="ctr"/>
+            <a:endParaRPr lang="es-CO"/>
+          </a:p>
+        </p:txBody>
+      </p:sp>
+      <p:pic>
+        <p:nvPicPr>
+          <p:cNvPr id="93" name="Imagen 92" descr="Imagen que contiene firmar, verde, sostener, señal&#10;&#10;Descripción generada automáticamente">
+            <a:extLst>
+              <a:ext uri="{FF2B5EF4-FFF2-40B4-BE49-F238E27FC236}">
+                <a16:creationId xmlns:a16="http://schemas.microsoft.com/office/drawing/2014/main" id="{0A0C81E5-1FBB-48B9-9A6D-24E8FAB7F44F}"/>
+              </a:ext>
+            </a:extLst>
+          </p:cNvPr>
+          <p:cNvPicPr>
+            <a:picLocks noChangeAspect="1"/>
+          </p:cNvPicPr>
+          <p:nvPr/>
+        </p:nvPicPr>
+        <p:blipFill>
+          <a:blip r:embed="rId7">
+            <a:extLst>
+              <a:ext uri="{28A0092B-C50C-407E-A947-70E740481C1C}">
+                <a14:useLocalDpi xmlns:a14="http://schemas.microsoft.com/office/drawing/2010/main" val="0"/>
+              </a:ext>
+              <a:ext uri="{837473B0-CC2E-450A-ABE3-18F120FF3D39}">
+                <a1611:picAttrSrcUrl xmlns:a1611="http://schemas.microsoft.com/office/drawing/2016/11/main" r:id="rId8"/>
+              </a:ext>
+            </a:extLst>
+          </a:blip>
+          <a:stretch>
+            <a:fillRect/>
+          </a:stretch>
+        </p:blipFill>
+        <p:spPr>
+          <a:xfrm>
+            <a:off x="454322" y="5952648"/>
+            <a:ext cx="345322" cy="345322"/>
+          </a:xfrm>
+          <a:prstGeom prst="rect">
+            <a:avLst/>
+          </a:prstGeom>
+        </p:spPr>
+      </p:pic>
+      <p:cxnSp>
+        <p:nvCxnSpPr>
+          <p:cNvPr id="101" name="Conector: angular 100">
+            <a:extLst>
+              <a:ext uri="{FF2B5EF4-FFF2-40B4-BE49-F238E27FC236}">
+                <a16:creationId xmlns:a16="http://schemas.microsoft.com/office/drawing/2014/main" id="{F5A10DDD-CAF7-4426-8165-EC0D1FDFA583}"/>
+              </a:ext>
+            </a:extLst>
+          </p:cNvPr>
+          <p:cNvCxnSpPr>
+            <a:cxnSpLocks/>
+            <a:stCxn id="8" idx="1"/>
+          </p:cNvCxnSpPr>
+          <p:nvPr/>
+        </p:nvCxnSpPr>
+        <p:spPr>
+          <a:xfrm rot="10800000" flipV="1">
+            <a:off x="5283136" y="2732454"/>
+            <a:ext cx="727779" cy="156"/>
+          </a:xfrm>
+          <a:prstGeom prst="bentConnector3">
+            <a:avLst>
+              <a:gd name="adj1" fmla="val 50000"/>
+            </a:avLst>
+          </a:prstGeom>
+          <a:ln w="57150">
+            <a:solidFill>
+              <a:schemeClr val="bg1"/>
+            </a:solidFill>
+            <a:tailEnd type="triangle"/>
+          </a:ln>
+        </p:spPr>
+        <p:style>
+          <a:lnRef idx="1">
+            <a:schemeClr val="accent1"/>
+          </a:lnRef>
+          <a:fillRef idx="0">
+            <a:schemeClr val="accent1"/>
+          </a:fillRef>
+          <a:effectRef idx="0">
+            <a:schemeClr val="accent1"/>
+          </a:effectRef>
+          <a:fontRef idx="minor">
+            <a:schemeClr val="tx1"/>
+          </a:fontRef>
+        </p:style>
+      </p:cxnSp>
+      <p:sp>
+        <p:nvSpPr>
+          <p:cNvPr id="103" name="Rectángulo 102">
+            <a:extLst>
+              <a:ext uri="{FF2B5EF4-FFF2-40B4-BE49-F238E27FC236}">
+                <a16:creationId xmlns:a16="http://schemas.microsoft.com/office/drawing/2014/main" id="{9FBCD2D2-06AC-417A-93D8-F2E241F0EFC6}"/>
+              </a:ext>
+            </a:extLst>
+          </p:cNvPr>
+          <p:cNvSpPr/>
+          <p:nvPr/>
+        </p:nvSpPr>
+        <p:spPr>
+          <a:xfrm>
+            <a:off x="6004325" y="4472588"/>
+            <a:ext cx="1079368" cy="712047"/>
+          </a:xfrm>
+          <a:prstGeom prst="rect">
+            <a:avLst/>
+          </a:prstGeom>
+          <a:solidFill>
+            <a:schemeClr val="accent2"/>
+          </a:solidFill>
+          <a:ln>
+            <a:noFill/>
+          </a:ln>
+        </p:spPr>
+        <p:style>
+          <a:lnRef idx="2">
+            <a:schemeClr val="accent1">
+              <a:shade val="50000"/>
+            </a:schemeClr>
+          </a:lnRef>
+          <a:fillRef idx="1">
+            <a:schemeClr val="accent1"/>
+          </a:fillRef>
+          <a:effectRef idx="0">
+            <a:schemeClr val="accent1"/>
+          </a:effectRef>
+          <a:fontRef idx="minor">
+            <a:schemeClr val="lt1"/>
+          </a:fontRef>
+        </p:style>
+        <p:txBody>
+          <a:bodyPr rtlCol="0" anchor="ctr"/>
+          <a:lstStyle/>
+          <a:p>
+            <a:pPr algn="ctr"/>
+            <a:r>
+              <a:rPr lang="es-CO" sz="1400" dirty="0"/>
+              <a:t>Network ACL</a:t>
+            </a:r>
+          </a:p>
+        </p:txBody>
+      </p:sp>
+      <p:sp>
+        <p:nvSpPr>
+          <p:cNvPr id="104" name="Rectángulo 103">
+            <a:extLst>
+              <a:ext uri="{FF2B5EF4-FFF2-40B4-BE49-F238E27FC236}">
+                <a16:creationId xmlns:a16="http://schemas.microsoft.com/office/drawing/2014/main" id="{A356A640-9685-4943-A075-A072F6C1149F}"/>
+              </a:ext>
+            </a:extLst>
+          </p:cNvPr>
+          <p:cNvSpPr/>
+          <p:nvPr/>
+        </p:nvSpPr>
+        <p:spPr>
+          <a:xfrm>
+            <a:off x="7430541" y="4455215"/>
+            <a:ext cx="906463" cy="746792"/>
+          </a:xfrm>
+          <a:prstGeom prst="rect">
+            <a:avLst/>
+          </a:prstGeom>
+          <a:solidFill>
+            <a:schemeClr val="accent2"/>
+          </a:solidFill>
+          <a:ln>
+            <a:noFill/>
+          </a:ln>
+        </p:spPr>
+        <p:style>
+          <a:lnRef idx="2">
+            <a:schemeClr val="accent1">
+              <a:shade val="50000"/>
+            </a:schemeClr>
+          </a:lnRef>
+          <a:fillRef idx="1">
+            <a:schemeClr val="accent1"/>
+          </a:fillRef>
+          <a:effectRef idx="0">
+            <a:schemeClr val="accent1"/>
+          </a:effectRef>
+          <a:fontRef idx="minor">
+            <a:schemeClr val="lt1"/>
+          </a:fontRef>
+        </p:style>
+        <p:txBody>
+          <a:bodyPr rtlCol="0" anchor="ctr"/>
+          <a:lstStyle/>
+          <a:p>
+            <a:pPr algn="ctr"/>
+            <a:r>
+              <a:rPr lang="es-CO" sz="1400" dirty="0" err="1"/>
+              <a:t>Route</a:t>
+            </a:r>
+            <a:r>
+              <a:rPr lang="es-CO" sz="1400" dirty="0"/>
+              <a:t> Table</a:t>
+            </a:r>
+          </a:p>
+        </p:txBody>
+      </p:sp>
+      <p:cxnSp>
+        <p:nvCxnSpPr>
+          <p:cNvPr id="106" name="Conector recto de flecha 105">
+            <a:extLst>
+              <a:ext uri="{FF2B5EF4-FFF2-40B4-BE49-F238E27FC236}">
+                <a16:creationId xmlns:a16="http://schemas.microsoft.com/office/drawing/2014/main" id="{C489788B-0D15-4EB7-B87D-CDE4CD96EB7E}"/>
+              </a:ext>
+            </a:extLst>
+          </p:cNvPr>
+          <p:cNvCxnSpPr>
+            <a:cxnSpLocks/>
+            <a:stCxn id="104" idx="1"/>
+            <a:endCxn id="103" idx="3"/>
+          </p:cNvCxnSpPr>
+          <p:nvPr/>
+        </p:nvCxnSpPr>
+        <p:spPr>
+          <a:xfrm flipH="1">
+            <a:off x="7083693" y="4828611"/>
+            <a:ext cx="346848" cy="1"/>
+          </a:xfrm>
+          <a:prstGeom prst="straightConnector1">
+            <a:avLst/>
+          </a:prstGeom>
+          <a:ln w="57150">
+            <a:solidFill>
+              <a:schemeClr val="bg1"/>
+            </a:solidFill>
+            <a:tailEnd type="triangle"/>
+          </a:ln>
+        </p:spPr>
+        <p:style>
+          <a:lnRef idx="1">
+            <a:schemeClr val="accent1"/>
+          </a:lnRef>
+          <a:fillRef idx="0">
+            <a:schemeClr val="accent1"/>
+          </a:fillRef>
+          <a:effectRef idx="0">
+            <a:schemeClr val="accent1"/>
+          </a:effectRef>
+          <a:fontRef idx="minor">
+            <a:schemeClr val="tx1"/>
+          </a:fontRef>
+        </p:style>
+      </p:cxnSp>
+      <p:cxnSp>
+        <p:nvCxnSpPr>
+          <p:cNvPr id="107" name="Conector: angular 106">
+            <a:extLst>
+              <a:ext uri="{FF2B5EF4-FFF2-40B4-BE49-F238E27FC236}">
+                <a16:creationId xmlns:a16="http://schemas.microsoft.com/office/drawing/2014/main" id="{2CAF64C2-4F36-4FB4-93ED-213437D55EDC}"/>
+              </a:ext>
+            </a:extLst>
+          </p:cNvPr>
+          <p:cNvCxnSpPr>
+            <a:cxnSpLocks/>
+            <a:stCxn id="103" idx="1"/>
+          </p:cNvCxnSpPr>
+          <p:nvPr/>
+        </p:nvCxnSpPr>
+        <p:spPr>
+          <a:xfrm rot="10800000" flipV="1">
+            <a:off x="5321405" y="4828611"/>
+            <a:ext cx="682921" cy="6463"/>
+          </a:xfrm>
+          <a:prstGeom prst="bentConnector3">
+            <a:avLst>
+              <a:gd name="adj1" fmla="val 50000"/>
+            </a:avLst>
+          </a:prstGeom>
+          <a:ln w="57150">
+            <a:solidFill>
+              <a:schemeClr val="bg1"/>
+            </a:solidFill>
+            <a:tailEnd type="triangle"/>
+          </a:ln>
+        </p:spPr>
+        <p:style>
+          <a:lnRef idx="1">
+            <a:schemeClr val="accent1"/>
+          </a:lnRef>
+          <a:fillRef idx="0">
+            <a:schemeClr val="accent1"/>
+          </a:fillRef>
+          <a:effectRef idx="0">
+            <a:schemeClr val="accent1"/>
+          </a:effectRef>
+          <a:fontRef idx="minor">
+            <a:schemeClr val="tx1"/>
+          </a:fontRef>
+        </p:style>
+      </p:cxnSp>
+      <p:cxnSp>
+        <p:nvCxnSpPr>
+          <p:cNvPr id="115" name="Conector: angular 114">
+            <a:extLst>
+              <a:ext uri="{FF2B5EF4-FFF2-40B4-BE49-F238E27FC236}">
+                <a16:creationId xmlns:a16="http://schemas.microsoft.com/office/drawing/2014/main" id="{665294A6-D934-4F09-8A6D-464E97B62AF4}"/>
+              </a:ext>
+            </a:extLst>
+          </p:cNvPr>
+          <p:cNvCxnSpPr>
+            <a:cxnSpLocks/>
+            <a:stCxn id="83" idx="2"/>
+            <a:endCxn id="104" idx="0"/>
+          </p:cNvCxnSpPr>
+          <p:nvPr/>
+        </p:nvCxnSpPr>
+        <p:spPr>
+          <a:xfrm rot="5400000">
+            <a:off x="7210938" y="3778685"/>
+            <a:ext cx="1349365" cy="3694"/>
+          </a:xfrm>
+          <a:prstGeom prst="bentConnector3">
+            <a:avLst>
+              <a:gd name="adj1" fmla="val 50000"/>
+            </a:avLst>
+          </a:prstGeom>
+          <a:ln w="57150">
+            <a:solidFill>
+              <a:schemeClr val="bg1"/>
+            </a:solidFill>
+            <a:tailEnd type="triangle"/>
+          </a:ln>
+        </p:spPr>
+        <p:style>
+          <a:lnRef idx="1">
+            <a:schemeClr val="accent1"/>
+          </a:lnRef>
+          <a:fillRef idx="0">
+            <a:schemeClr val="accent1"/>
+          </a:fillRef>
+          <a:effectRef idx="0">
+            <a:schemeClr val="accent1"/>
+          </a:effectRef>
+          <a:fontRef idx="minor">
+            <a:schemeClr val="tx1"/>
+          </a:fontRef>
+        </p:style>
+      </p:cxnSp>
+      <p:cxnSp>
+        <p:nvCxnSpPr>
+          <p:cNvPr id="10" name="Conector: angular 9">
+            <a:extLst>
+              <a:ext uri="{FF2B5EF4-FFF2-40B4-BE49-F238E27FC236}">
+                <a16:creationId xmlns:a16="http://schemas.microsoft.com/office/drawing/2014/main" id="{1AE7E56C-2400-426D-BAD5-BD885DCA2D09}"/>
+              </a:ext>
+            </a:extLst>
+          </p:cNvPr>
+          <p:cNvCxnSpPr>
+            <a:cxnSpLocks/>
+            <a:stCxn id="8" idx="0"/>
+          </p:cNvCxnSpPr>
+          <p:nvPr/>
+        </p:nvCxnSpPr>
+        <p:spPr>
+          <a:xfrm rot="16200000" flipV="1">
+            <a:off x="6028464" y="1854295"/>
+            <a:ext cx="379464" cy="664805"/>
+          </a:xfrm>
+          <a:prstGeom prst="bentConnector2">
+            <a:avLst/>
+          </a:prstGeom>
+          <a:ln>
+            <a:tailEnd type="triangle"/>
+          </a:ln>
+        </p:spPr>
+        <p:style>
+          <a:lnRef idx="1">
+            <a:schemeClr val="accent1"/>
+          </a:lnRef>
+          <a:fillRef idx="0">
+            <a:schemeClr val="accent1"/>
+          </a:fillRef>
+          <a:effectRef idx="0">
+            <a:schemeClr val="accent1"/>
+          </a:effectRef>
+          <a:fontRef idx="minor">
+            <a:schemeClr val="tx1"/>
+          </a:fontRef>
+        </p:style>
+      </p:cxnSp>
+      <p:cxnSp>
+        <p:nvCxnSpPr>
+          <p:cNvPr id="67" name="Conector: angular 66">
+            <a:extLst>
+              <a:ext uri="{FF2B5EF4-FFF2-40B4-BE49-F238E27FC236}">
+                <a16:creationId xmlns:a16="http://schemas.microsoft.com/office/drawing/2014/main" id="{D592C29E-36C9-4B61-89D8-4E9A4E223517}"/>
+              </a:ext>
+            </a:extLst>
+          </p:cNvPr>
+          <p:cNvCxnSpPr>
+            <a:cxnSpLocks/>
+            <a:endCxn id="8" idx="2"/>
+          </p:cNvCxnSpPr>
+          <p:nvPr/>
+        </p:nvCxnSpPr>
+        <p:spPr>
+          <a:xfrm flipV="1">
+            <a:off x="5703012" y="3088477"/>
+            <a:ext cx="847586" cy="242344"/>
+          </a:xfrm>
+          <a:prstGeom prst="bentConnector2">
+            <a:avLst/>
+          </a:prstGeom>
+          <a:ln>
+            <a:tailEnd type="triangle"/>
+          </a:ln>
+        </p:spPr>
+        <p:style>
+          <a:lnRef idx="1">
+            <a:schemeClr val="accent1"/>
+          </a:lnRef>
+          <a:fillRef idx="0">
+            <a:schemeClr val="accent1"/>
+          </a:fillRef>
+          <a:effectRef idx="0">
+            <a:schemeClr val="accent1"/>
+          </a:effectRef>
+          <a:fontRef idx="minor">
+            <a:schemeClr val="tx1"/>
+          </a:fontRef>
+        </p:style>
+      </p:cxnSp>
+      <p:cxnSp>
+        <p:nvCxnSpPr>
+          <p:cNvPr id="71" name="Conector: angular 70">
+            <a:extLst>
+              <a:ext uri="{FF2B5EF4-FFF2-40B4-BE49-F238E27FC236}">
+                <a16:creationId xmlns:a16="http://schemas.microsoft.com/office/drawing/2014/main" id="{EFE59015-58C5-4314-9C60-C8DD4C9FA700}"/>
+              </a:ext>
+            </a:extLst>
+          </p:cNvPr>
+          <p:cNvCxnSpPr>
+            <a:cxnSpLocks/>
+            <a:stCxn id="103" idx="0"/>
+          </p:cNvCxnSpPr>
+          <p:nvPr/>
+        </p:nvCxnSpPr>
+        <p:spPr>
+          <a:xfrm rot="16200000" flipV="1">
+            <a:off x="6012361" y="3940939"/>
+            <a:ext cx="163347" cy="899951"/>
+          </a:xfrm>
+          <a:prstGeom prst="bentConnector2">
+            <a:avLst/>
+          </a:prstGeom>
+          <a:ln>
+            <a:tailEnd type="triangle"/>
+          </a:ln>
+        </p:spPr>
+        <p:style>
+          <a:lnRef idx="1">
+            <a:schemeClr val="accent1"/>
+          </a:lnRef>
+          <a:fillRef idx="0">
+            <a:schemeClr val="accent1"/>
+          </a:fillRef>
+          <a:effectRef idx="0">
+            <a:schemeClr val="accent1"/>
+          </a:effectRef>
+          <a:fontRef idx="minor">
+            <a:schemeClr val="tx1"/>
+          </a:fontRef>
+        </p:style>
+      </p:cxnSp>
+      <p:cxnSp>
+        <p:nvCxnSpPr>
+          <p:cNvPr id="74" name="Conector: angular 73">
+            <a:extLst>
+              <a:ext uri="{FF2B5EF4-FFF2-40B4-BE49-F238E27FC236}">
+                <a16:creationId xmlns:a16="http://schemas.microsoft.com/office/drawing/2014/main" id="{C0D72A49-EE43-4F51-B931-913B99D5C86C}"/>
+              </a:ext>
+            </a:extLst>
+          </p:cNvPr>
+          <p:cNvCxnSpPr>
+            <a:cxnSpLocks/>
+            <a:endCxn id="103" idx="2"/>
+          </p:cNvCxnSpPr>
+          <p:nvPr/>
+        </p:nvCxnSpPr>
+        <p:spPr>
+          <a:xfrm flipV="1">
+            <a:off x="5644060" y="5184635"/>
+            <a:ext cx="899949" cy="217141"/>
+          </a:xfrm>
+          <a:prstGeom prst="bentConnector2">
+            <a:avLst/>
+          </a:prstGeom>
+          <a:ln>
+            <a:tailEnd type="triangle"/>
+          </a:ln>
+        </p:spPr>
+        <p:style>
+          <a:lnRef idx="1">
+            <a:schemeClr val="accent1"/>
+          </a:lnRef>
+          <a:fillRef idx="0">
+            <a:schemeClr val="accent1"/>
+          </a:fillRef>
+          <a:effectRef idx="0">
+            <a:schemeClr val="accent1"/>
+          </a:effectRef>
+          <a:fontRef idx="minor">
+            <a:schemeClr val="tx1"/>
+          </a:fontRef>
+        </p:style>
+      </p:cxnSp>
+      <p:sp>
+        <p:nvSpPr>
+          <p:cNvPr id="81" name="CuadroTexto 80">
+            <a:extLst>
+              <a:ext uri="{FF2B5EF4-FFF2-40B4-BE49-F238E27FC236}">
+                <a16:creationId xmlns:a16="http://schemas.microsoft.com/office/drawing/2014/main" id="{8C197DB9-E567-4E3A-AA91-D456D82E3987}"/>
+              </a:ext>
+            </a:extLst>
+          </p:cNvPr>
+          <p:cNvSpPr txBox="1"/>
+          <p:nvPr/>
+        </p:nvSpPr>
+        <p:spPr>
+          <a:xfrm>
+            <a:off x="5312628" y="1456226"/>
+            <a:ext cx="1168525" cy="307777"/>
+          </a:xfrm>
+          <a:prstGeom prst="rect">
+            <a:avLst/>
+          </a:prstGeom>
+          <a:noFill/>
+        </p:spPr>
+        <p:txBody>
+          <a:bodyPr wrap="none" rtlCol="0">
+            <a:spAutoFit/>
+          </a:bodyPr>
+          <a:lstStyle>
+            <a:defPPr>
+              <a:defRPr lang="es-CO"/>
+            </a:defPPr>
+            <a:lvl1pPr>
+              <a:defRPr sz="1400">
+                <a:solidFill>
+                  <a:schemeClr val="bg1"/>
+                </a:solidFill>
+              </a:defRPr>
+            </a:lvl1pPr>
+          </a:lstStyle>
+          <a:p>
+            <a:r>
+              <a:rPr lang="es-CO" dirty="0"/>
+              <a:t>Permisos  FW</a:t>
+            </a:r>
+          </a:p>
+        </p:txBody>
+      </p:sp>
+      <p:sp>
+        <p:nvSpPr>
+          <p:cNvPr id="87" name="CuadroTexto 86">
+            <a:extLst>
+              <a:ext uri="{FF2B5EF4-FFF2-40B4-BE49-F238E27FC236}">
+                <a16:creationId xmlns:a16="http://schemas.microsoft.com/office/drawing/2014/main" id="{7A6C539D-E2E0-4C5C-AB95-8520DD87DCA2}"/>
+              </a:ext>
+            </a:extLst>
+          </p:cNvPr>
+          <p:cNvSpPr txBox="1"/>
+          <p:nvPr/>
+        </p:nvSpPr>
+        <p:spPr>
+          <a:xfrm>
+            <a:off x="5404188" y="3405343"/>
+            <a:ext cx="1168525" cy="307777"/>
+          </a:xfrm>
+          <a:prstGeom prst="rect">
+            <a:avLst/>
+          </a:prstGeom>
+          <a:noFill/>
+        </p:spPr>
+        <p:txBody>
+          <a:bodyPr wrap="none" rtlCol="0">
+            <a:spAutoFit/>
+          </a:bodyPr>
+          <a:lstStyle>
+            <a:defPPr>
+              <a:defRPr lang="es-CO"/>
+            </a:defPPr>
+            <a:lvl1pPr>
+              <a:defRPr sz="1400">
+                <a:solidFill>
+                  <a:schemeClr val="bg1"/>
+                </a:solidFill>
+              </a:defRPr>
+            </a:lvl1pPr>
+          </a:lstStyle>
+          <a:p>
+            <a:r>
+              <a:rPr lang="es-CO" dirty="0"/>
+              <a:t>Permisos  FW</a:t>
+            </a:r>
+          </a:p>
+        </p:txBody>
+      </p:sp>
+      <p:sp>
+        <p:nvSpPr>
+          <p:cNvPr id="89" name="CuadroTexto 88">
+            <a:extLst>
+              <a:ext uri="{FF2B5EF4-FFF2-40B4-BE49-F238E27FC236}">
+                <a16:creationId xmlns:a16="http://schemas.microsoft.com/office/drawing/2014/main" id="{F59ECF87-82DE-4BDB-BDB7-7AC0086E59DA}"/>
+              </a:ext>
+            </a:extLst>
+          </p:cNvPr>
+          <p:cNvSpPr txBox="1"/>
+          <p:nvPr/>
+        </p:nvSpPr>
+        <p:spPr>
+          <a:xfrm>
+            <a:off x="5379643" y="3901835"/>
+            <a:ext cx="1168525" cy="307777"/>
+          </a:xfrm>
+          <a:prstGeom prst="rect">
+            <a:avLst/>
+          </a:prstGeom>
+          <a:noFill/>
+        </p:spPr>
+        <p:txBody>
+          <a:bodyPr wrap="none" rtlCol="0">
+            <a:spAutoFit/>
+          </a:bodyPr>
+          <a:lstStyle>
+            <a:defPPr>
+              <a:defRPr lang="es-CO"/>
+            </a:defPPr>
+            <a:lvl1pPr>
+              <a:defRPr sz="1400">
+                <a:solidFill>
+                  <a:schemeClr val="bg1"/>
+                </a:solidFill>
+              </a:defRPr>
+            </a:lvl1pPr>
+          </a:lstStyle>
+          <a:p>
+            <a:r>
+              <a:rPr lang="es-CO" dirty="0"/>
+              <a:t>Permisos  FW</a:t>
+            </a:r>
+          </a:p>
+        </p:txBody>
+      </p:sp>
+      <p:sp>
+        <p:nvSpPr>
+          <p:cNvPr id="91" name="CuadroTexto 90">
+            <a:extLst>
+              <a:ext uri="{FF2B5EF4-FFF2-40B4-BE49-F238E27FC236}">
+                <a16:creationId xmlns:a16="http://schemas.microsoft.com/office/drawing/2014/main" id="{C1749C44-44EB-4C52-B4A2-255E11ED3E7C}"/>
+              </a:ext>
+            </a:extLst>
+          </p:cNvPr>
+          <p:cNvSpPr txBox="1"/>
+          <p:nvPr/>
+        </p:nvSpPr>
+        <p:spPr>
+          <a:xfrm>
+            <a:off x="5497717" y="5546725"/>
+            <a:ext cx="1168525" cy="307777"/>
+          </a:xfrm>
+          <a:prstGeom prst="rect">
+            <a:avLst/>
+          </a:prstGeom>
+          <a:noFill/>
+        </p:spPr>
+        <p:txBody>
+          <a:bodyPr wrap="none" rtlCol="0">
+            <a:spAutoFit/>
+          </a:bodyPr>
+          <a:lstStyle>
+            <a:defPPr>
+              <a:defRPr lang="es-CO"/>
+            </a:defPPr>
+            <a:lvl1pPr>
+              <a:defRPr sz="1400">
+                <a:solidFill>
+                  <a:schemeClr val="bg1"/>
+                </a:solidFill>
+              </a:defRPr>
+            </a:lvl1pPr>
+          </a:lstStyle>
+          <a:p>
+            <a:r>
+              <a:rPr lang="es-CO" dirty="0"/>
+              <a:t>Permisos  FW</a:t>
+            </a:r>
+          </a:p>
+        </p:txBody>
+      </p:sp>
+      <p:sp>
+        <p:nvSpPr>
+          <p:cNvPr id="82" name="Rectángulo 81">
+            <a:extLst>
+              <a:ext uri="{FF2B5EF4-FFF2-40B4-BE49-F238E27FC236}">
+                <a16:creationId xmlns:a16="http://schemas.microsoft.com/office/drawing/2014/main" id="{C6C2038C-C1B6-4C88-BAC8-90348958A8B1}"/>
+              </a:ext>
+            </a:extLst>
+          </p:cNvPr>
+          <p:cNvSpPr/>
+          <p:nvPr/>
+        </p:nvSpPr>
+        <p:spPr>
+          <a:xfrm>
+            <a:off x="7511932" y="3554012"/>
+            <a:ext cx="723614" cy="440758"/>
+          </a:xfrm>
+          <a:prstGeom prst="rect">
+            <a:avLst/>
+          </a:prstGeom>
+          <a:solidFill>
+            <a:schemeClr val="accent2"/>
+          </a:solidFill>
+          <a:ln>
+            <a:noFill/>
+          </a:ln>
+        </p:spPr>
+        <p:style>
+          <a:lnRef idx="2">
+            <a:schemeClr val="accent1">
+              <a:shade val="50000"/>
+            </a:schemeClr>
+          </a:lnRef>
+          <a:fillRef idx="1">
+            <a:schemeClr val="accent1"/>
+          </a:fillRef>
+          <a:effectRef idx="0">
+            <a:schemeClr val="accent1"/>
+          </a:effectRef>
+          <a:fontRef idx="minor">
+            <a:schemeClr val="lt1"/>
+          </a:fontRef>
+        </p:style>
+        <p:txBody>
+          <a:bodyPr rtlCol="0" anchor="ctr"/>
+          <a:lstStyle/>
+          <a:p>
+            <a:pPr algn="ctr"/>
+            <a:r>
+              <a:rPr lang="es-CO" sz="1000" dirty="0"/>
+              <a:t>NAT GATEWAY</a:t>
+            </a:r>
+          </a:p>
+        </p:txBody>
+      </p:sp>
+      <p:cxnSp>
+        <p:nvCxnSpPr>
+          <p:cNvPr id="116" name="Conector: angular 115">
+            <a:extLst>
+              <a:ext uri="{FF2B5EF4-FFF2-40B4-BE49-F238E27FC236}">
+                <a16:creationId xmlns:a16="http://schemas.microsoft.com/office/drawing/2014/main" id="{2573B79E-2E04-40F9-8A86-EBC887924045}"/>
+              </a:ext>
+            </a:extLst>
+          </p:cNvPr>
+          <p:cNvCxnSpPr>
+            <a:cxnSpLocks/>
+            <a:stCxn id="9222" idx="1"/>
+            <a:endCxn id="104" idx="3"/>
+          </p:cNvCxnSpPr>
+          <p:nvPr/>
+        </p:nvCxnSpPr>
+        <p:spPr>
+          <a:xfrm rot="10800000" flipV="1">
+            <a:off x="8337005" y="3653451"/>
+            <a:ext cx="663131" cy="1175160"/>
+          </a:xfrm>
+          <a:prstGeom prst="bentConnector3">
+            <a:avLst>
+              <a:gd name="adj1" fmla="val 50000"/>
+            </a:avLst>
+          </a:prstGeom>
+          <a:ln w="57150">
+            <a:solidFill>
+              <a:schemeClr val="bg1"/>
+            </a:solidFill>
+            <a:tailEnd type="triangle"/>
+          </a:ln>
+        </p:spPr>
+        <p:style>
+          <a:lnRef idx="1">
+            <a:schemeClr val="accent1"/>
+          </a:lnRef>
+          <a:fillRef idx="0">
+            <a:schemeClr val="accent1"/>
+          </a:fillRef>
+          <a:effectRef idx="0">
+            <a:schemeClr val="accent1"/>
+          </a:effectRef>
+          <a:fontRef idx="minor">
+            <a:schemeClr val="tx1"/>
+          </a:fontRef>
+        </p:style>
+      </p:cxnSp>
+      <p:pic>
+        <p:nvPicPr>
+          <p:cNvPr id="126" name="Imagen 125" descr="Imagen que contiene firmar, verde, sostener, señal&#10;&#10;Descripción generada automáticamente">
+            <a:extLst>
+              <a:ext uri="{FF2B5EF4-FFF2-40B4-BE49-F238E27FC236}">
+                <a16:creationId xmlns:a16="http://schemas.microsoft.com/office/drawing/2014/main" id="{7B1D0560-9974-4A90-95D5-ACB8C9E7CFFD}"/>
+              </a:ext>
+            </a:extLst>
+          </p:cNvPr>
+          <p:cNvPicPr>
+            <a:picLocks noChangeAspect="1"/>
+          </p:cNvPicPr>
+          <p:nvPr/>
+        </p:nvPicPr>
+        <p:blipFill>
+          <a:blip r:embed="rId7">
+            <a:extLst>
+              <a:ext uri="{28A0092B-C50C-407E-A947-70E740481C1C}">
+                <a14:useLocalDpi xmlns:a14="http://schemas.microsoft.com/office/drawing/2010/main" val="0"/>
+              </a:ext>
+              <a:ext uri="{837473B0-CC2E-450A-ABE3-18F120FF3D39}">
+                <a1611:picAttrSrcUrl xmlns:a1611="http://schemas.microsoft.com/office/drawing/2016/11/main" r:id="rId8"/>
+              </a:ext>
+            </a:extLst>
+          </a:blip>
+          <a:stretch>
+            <a:fillRect/>
+          </a:stretch>
+        </p:blipFill>
+        <p:spPr>
+          <a:xfrm>
+            <a:off x="6022519" y="2376428"/>
+            <a:ext cx="194925" cy="194925"/>
+          </a:xfrm>
+          <a:prstGeom prst="rect">
+            <a:avLst/>
+          </a:prstGeom>
+        </p:spPr>
+      </p:pic>
+      <p:pic>
+        <p:nvPicPr>
+          <p:cNvPr id="127" name="Imagen 126" descr="Imagen que contiene firmar, verde, sostener, señal&#10;&#10;Descripción generada automáticamente">
+            <a:extLst>
+              <a:ext uri="{FF2B5EF4-FFF2-40B4-BE49-F238E27FC236}">
+                <a16:creationId xmlns:a16="http://schemas.microsoft.com/office/drawing/2014/main" id="{4E53A9F9-6157-4A03-A2DD-9EBE1286DC2B}"/>
+              </a:ext>
+            </a:extLst>
+          </p:cNvPr>
+          <p:cNvPicPr>
+            <a:picLocks noChangeAspect="1"/>
+          </p:cNvPicPr>
+          <p:nvPr/>
+        </p:nvPicPr>
+        <p:blipFill>
+          <a:blip r:embed="rId7">
+            <a:extLst>
+              <a:ext uri="{28A0092B-C50C-407E-A947-70E740481C1C}">
+                <a14:useLocalDpi xmlns:a14="http://schemas.microsoft.com/office/drawing/2010/main" val="0"/>
+              </a:ext>
+              <a:ext uri="{837473B0-CC2E-450A-ABE3-18F120FF3D39}">
+                <a1611:picAttrSrcUrl xmlns:a1611="http://schemas.microsoft.com/office/drawing/2016/11/main" r:id="rId8"/>
+              </a:ext>
+            </a:extLst>
+          </a:blip>
+          <a:stretch>
+            <a:fillRect/>
+          </a:stretch>
+        </p:blipFill>
+        <p:spPr>
+          <a:xfrm>
+            <a:off x="5992650" y="4519058"/>
+            <a:ext cx="194925" cy="194925"/>
+          </a:xfrm>
+          <a:prstGeom prst="rect">
+            <a:avLst/>
+          </a:prstGeom>
+        </p:spPr>
+      </p:pic>
+      <p:pic>
+        <p:nvPicPr>
+          <p:cNvPr id="128" name="Imagen 127" descr="Imagen que contiene firmar, verde, sostener, señal&#10;&#10;Descripción generada automáticamente">
+            <a:extLst>
+              <a:ext uri="{FF2B5EF4-FFF2-40B4-BE49-F238E27FC236}">
+                <a16:creationId xmlns:a16="http://schemas.microsoft.com/office/drawing/2014/main" id="{ACBB1DF5-34D8-474F-98F9-22375CFBA377}"/>
+              </a:ext>
+            </a:extLst>
+          </p:cNvPr>
+          <p:cNvPicPr>
+            <a:picLocks noChangeAspect="1"/>
+          </p:cNvPicPr>
+          <p:nvPr/>
+        </p:nvPicPr>
+        <p:blipFill>
+          <a:blip r:embed="rId7">
+            <a:extLst>
+              <a:ext uri="{28A0092B-C50C-407E-A947-70E740481C1C}">
+                <a14:useLocalDpi xmlns:a14="http://schemas.microsoft.com/office/drawing/2010/main" val="0"/>
+              </a:ext>
+              <a:ext uri="{837473B0-CC2E-450A-ABE3-18F120FF3D39}">
+                <a1611:picAttrSrcUrl xmlns:a1611="http://schemas.microsoft.com/office/drawing/2016/11/main" r:id="rId8"/>
+              </a:ext>
+            </a:extLst>
+          </a:blip>
+          <a:stretch>
+            <a:fillRect/>
+          </a:stretch>
+        </p:blipFill>
+        <p:spPr>
+          <a:xfrm>
+            <a:off x="7443838" y="2376427"/>
+            <a:ext cx="194925" cy="194925"/>
+          </a:xfrm>
+          <a:prstGeom prst="rect">
+            <a:avLst/>
+          </a:prstGeom>
+        </p:spPr>
+      </p:pic>
+      <p:pic>
+        <p:nvPicPr>
+          <p:cNvPr id="129" name="Imagen 128" descr="Imagen que contiene firmar, verde, sostener, señal&#10;&#10;Descripción generada automáticamente">
+            <a:extLst>
+              <a:ext uri="{FF2B5EF4-FFF2-40B4-BE49-F238E27FC236}">
+                <a16:creationId xmlns:a16="http://schemas.microsoft.com/office/drawing/2014/main" id="{A7068C0A-3C3E-41DF-9F56-D0D099C427EA}"/>
+              </a:ext>
+            </a:extLst>
+          </p:cNvPr>
+          <p:cNvPicPr>
+            <a:picLocks noChangeAspect="1"/>
+          </p:cNvPicPr>
+          <p:nvPr/>
+        </p:nvPicPr>
+        <p:blipFill>
+          <a:blip r:embed="rId7">
+            <a:extLst>
+              <a:ext uri="{28A0092B-C50C-407E-A947-70E740481C1C}">
+                <a14:useLocalDpi xmlns:a14="http://schemas.microsoft.com/office/drawing/2010/main" val="0"/>
+              </a:ext>
+              <a:ext uri="{837473B0-CC2E-450A-ABE3-18F120FF3D39}">
+                <a1611:picAttrSrcUrl xmlns:a1611="http://schemas.microsoft.com/office/drawing/2016/11/main" r:id="rId8"/>
+              </a:ext>
+            </a:extLst>
+          </a:blip>
+          <a:stretch>
+            <a:fillRect/>
+          </a:stretch>
+        </p:blipFill>
+        <p:spPr>
+          <a:xfrm>
+            <a:off x="7499775" y="3545855"/>
+            <a:ext cx="194925" cy="194925"/>
+          </a:xfrm>
+          <a:prstGeom prst="rect">
+            <a:avLst/>
+          </a:prstGeom>
+        </p:spPr>
+      </p:pic>
+      <p:pic>
+        <p:nvPicPr>
+          <p:cNvPr id="130" name="Imagen 129" descr="Imagen que contiene firmar, verde, sostener, señal&#10;&#10;Descripción generada automáticamente">
+            <a:extLst>
+              <a:ext uri="{FF2B5EF4-FFF2-40B4-BE49-F238E27FC236}">
+                <a16:creationId xmlns:a16="http://schemas.microsoft.com/office/drawing/2014/main" id="{FE405CDB-64A0-4536-8495-185A6A3FDD80}"/>
+              </a:ext>
+            </a:extLst>
+          </p:cNvPr>
+          <p:cNvPicPr>
+            <a:picLocks noChangeAspect="1"/>
+          </p:cNvPicPr>
+          <p:nvPr/>
+        </p:nvPicPr>
+        <p:blipFill>
+          <a:blip r:embed="rId7">
+            <a:extLst>
+              <a:ext uri="{28A0092B-C50C-407E-A947-70E740481C1C}">
+                <a14:useLocalDpi xmlns:a14="http://schemas.microsoft.com/office/drawing/2010/main" val="0"/>
+              </a:ext>
+              <a:ext uri="{837473B0-CC2E-450A-ABE3-18F120FF3D39}">
+                <a1611:picAttrSrcUrl xmlns:a1611="http://schemas.microsoft.com/office/drawing/2016/11/main" r:id="rId8"/>
+              </a:ext>
+            </a:extLst>
+          </a:blip>
+          <a:stretch>
+            <a:fillRect/>
+          </a:stretch>
+        </p:blipFill>
+        <p:spPr>
+          <a:xfrm>
+            <a:off x="7425717" y="4431194"/>
+            <a:ext cx="194925" cy="194925"/>
+          </a:xfrm>
+          <a:prstGeom prst="rect">
+            <a:avLst/>
+          </a:prstGeom>
+        </p:spPr>
+      </p:pic>
+      <p:pic>
+        <p:nvPicPr>
+          <p:cNvPr id="131" name="Imagen 130" descr="Imagen que contiene firmar, verde, sostener, señal&#10;&#10;Descripción generada automáticamente">
+            <a:extLst>
+              <a:ext uri="{FF2B5EF4-FFF2-40B4-BE49-F238E27FC236}">
+                <a16:creationId xmlns:a16="http://schemas.microsoft.com/office/drawing/2014/main" id="{707EE2F4-6037-4899-92FA-A9ABFCEFFE52}"/>
+              </a:ext>
+            </a:extLst>
+          </p:cNvPr>
+          <p:cNvPicPr>
+            <a:picLocks noChangeAspect="1"/>
+          </p:cNvPicPr>
+          <p:nvPr/>
+        </p:nvPicPr>
+        <p:blipFill>
+          <a:blip r:embed="rId7">
+            <a:extLst>
+              <a:ext uri="{28A0092B-C50C-407E-A947-70E740481C1C}">
+                <a14:useLocalDpi xmlns:a14="http://schemas.microsoft.com/office/drawing/2010/main" val="0"/>
+              </a:ext>
+              <a:ext uri="{837473B0-CC2E-450A-ABE3-18F120FF3D39}">
+                <a1611:picAttrSrcUrl xmlns:a1611="http://schemas.microsoft.com/office/drawing/2016/11/main" r:id="rId8"/>
+              </a:ext>
+            </a:extLst>
+          </a:blip>
+          <a:stretch>
+            <a:fillRect/>
+          </a:stretch>
+        </p:blipFill>
+        <p:spPr>
+          <a:xfrm>
+            <a:off x="10366396" y="3307880"/>
+            <a:ext cx="194925" cy="194925"/>
+          </a:xfrm>
+          <a:prstGeom prst="rect">
+            <a:avLst/>
+          </a:prstGeom>
+        </p:spPr>
+      </p:pic>
+      <p:sp>
+        <p:nvSpPr>
+          <p:cNvPr id="78" name="Rectángulo 77">
+            <a:extLst>
+              <a:ext uri="{FF2B5EF4-FFF2-40B4-BE49-F238E27FC236}">
+                <a16:creationId xmlns:a16="http://schemas.microsoft.com/office/drawing/2014/main" id="{4ADA959D-3DFD-49A5-9539-9977C323FCEE}"/>
+              </a:ext>
+            </a:extLst>
+          </p:cNvPr>
+          <p:cNvSpPr/>
+          <p:nvPr/>
+        </p:nvSpPr>
+        <p:spPr>
+          <a:xfrm>
+            <a:off x="2289872" y="5018995"/>
+            <a:ext cx="1331037" cy="473138"/>
+          </a:xfrm>
+          <a:prstGeom prst="rect">
+            <a:avLst/>
+          </a:prstGeom>
+          <a:solidFill>
+            <a:schemeClr val="accent2"/>
+          </a:solidFill>
+          <a:ln>
+            <a:noFill/>
+          </a:ln>
+        </p:spPr>
+        <p:style>
+          <a:lnRef idx="2">
+            <a:schemeClr val="accent1">
+              <a:shade val="50000"/>
+            </a:schemeClr>
+          </a:lnRef>
+          <a:fillRef idx="1">
+            <a:schemeClr val="accent1"/>
+          </a:fillRef>
+          <a:effectRef idx="0">
+            <a:schemeClr val="accent1"/>
+          </a:effectRef>
+          <a:fontRef idx="minor">
+            <a:schemeClr val="lt1"/>
+          </a:fontRef>
+        </p:style>
+        <p:txBody>
+          <a:bodyPr rtlCol="0" anchor="ctr"/>
+          <a:lstStyle/>
+          <a:p>
+            <a:pPr algn="ctr"/>
+            <a:r>
+              <a:rPr lang="es-CO" sz="1100" dirty="0"/>
+              <a:t>DB &gt;</a:t>
+            </a:r>
+          </a:p>
+          <a:p>
+            <a:pPr algn="ctr"/>
+            <a:r>
+              <a:rPr lang="es-CO" sz="1100" b="0" i="0" dirty="0">
+                <a:solidFill>
+                  <a:srgbClr val="000000"/>
+                </a:solidFill>
+                <a:effectLst/>
+                <a:latin typeface="Times New Roman" panose="02020603050405020304" pitchFamily="18" charset="0"/>
+              </a:rPr>
+              <a:t>192.168.4.12</a:t>
+            </a:r>
+            <a:endParaRPr lang="es-CO" sz="1100" dirty="0"/>
+          </a:p>
+        </p:txBody>
+      </p:sp>
+      <p:sp>
+        <p:nvSpPr>
+          <p:cNvPr id="80" name="CuadroTexto 79">
+            <a:extLst>
+              <a:ext uri="{FF2B5EF4-FFF2-40B4-BE49-F238E27FC236}">
+                <a16:creationId xmlns:a16="http://schemas.microsoft.com/office/drawing/2014/main" id="{40E713B5-A99D-4A9B-BA2B-CE4B9254F37B}"/>
+              </a:ext>
+            </a:extLst>
+          </p:cNvPr>
+          <p:cNvSpPr txBox="1"/>
+          <p:nvPr/>
+        </p:nvSpPr>
+        <p:spPr>
+          <a:xfrm>
+            <a:off x="1545681" y="2280175"/>
+            <a:ext cx="1863011" cy="261610"/>
+          </a:xfrm>
+          <a:prstGeom prst="rect">
+            <a:avLst/>
+          </a:prstGeom>
+          <a:noFill/>
+        </p:spPr>
+        <p:txBody>
+          <a:bodyPr wrap="none" rtlCol="0">
+            <a:spAutoFit/>
+          </a:bodyPr>
+          <a:lstStyle>
+            <a:defPPr>
+              <a:defRPr lang="es-CO"/>
+            </a:defPPr>
+            <a:lvl1pPr>
+              <a:defRPr sz="1400">
+                <a:solidFill>
+                  <a:schemeClr val="bg1"/>
+                </a:solidFill>
+              </a:defRPr>
+            </a:lvl1pPr>
+          </a:lstStyle>
+          <a:p>
+            <a:r>
+              <a:rPr lang="es-CO" sz="1100" dirty="0"/>
+              <a:t>PUBLIC A SN(192.168.1.0/24)</a:t>
+            </a:r>
+          </a:p>
+        </p:txBody>
+      </p:sp>
+      <p:sp>
+        <p:nvSpPr>
+          <p:cNvPr id="85" name="CuadroTexto 84">
+            <a:extLst>
+              <a:ext uri="{FF2B5EF4-FFF2-40B4-BE49-F238E27FC236}">
+                <a16:creationId xmlns:a16="http://schemas.microsoft.com/office/drawing/2014/main" id="{E4315A01-C4A7-4517-B417-66F18E408766}"/>
+              </a:ext>
+            </a:extLst>
+          </p:cNvPr>
+          <p:cNvSpPr txBox="1"/>
+          <p:nvPr/>
+        </p:nvSpPr>
+        <p:spPr>
+          <a:xfrm>
+            <a:off x="1563636" y="3212786"/>
+            <a:ext cx="1858201" cy="261610"/>
+          </a:xfrm>
+          <a:prstGeom prst="rect">
+            <a:avLst/>
+          </a:prstGeom>
+          <a:noFill/>
+        </p:spPr>
+        <p:txBody>
+          <a:bodyPr wrap="none" rtlCol="0">
+            <a:spAutoFit/>
+          </a:bodyPr>
+          <a:lstStyle>
+            <a:defPPr>
+              <a:defRPr lang="es-CO"/>
+            </a:defPPr>
+            <a:lvl1pPr>
+              <a:defRPr sz="1400">
+                <a:solidFill>
+                  <a:schemeClr val="bg1"/>
+                </a:solidFill>
+              </a:defRPr>
+            </a:lvl1pPr>
+          </a:lstStyle>
+          <a:p>
+            <a:r>
+              <a:rPr lang="es-CO" sz="1100" dirty="0"/>
+              <a:t>PUBLIC B SN(192.168.2.0/24)</a:t>
+            </a:r>
+          </a:p>
+        </p:txBody>
+      </p:sp>
+      <p:pic>
+        <p:nvPicPr>
+          <p:cNvPr id="95" name="Imagen 94" descr="Imagen que contiene firmar, verde, sostener, señal&#10;&#10;Descripción generada automáticamente">
+            <a:extLst>
+              <a:ext uri="{FF2B5EF4-FFF2-40B4-BE49-F238E27FC236}">
+                <a16:creationId xmlns:a16="http://schemas.microsoft.com/office/drawing/2014/main" id="{5733B8C9-9D5A-4442-82A6-4304BBE988BD}"/>
+              </a:ext>
+            </a:extLst>
+          </p:cNvPr>
+          <p:cNvPicPr>
+            <a:picLocks noChangeAspect="1"/>
+          </p:cNvPicPr>
+          <p:nvPr/>
+        </p:nvPicPr>
+        <p:blipFill>
+          <a:blip r:embed="rId7">
+            <a:extLst>
+              <a:ext uri="{28A0092B-C50C-407E-A947-70E740481C1C}">
+                <a14:useLocalDpi xmlns:a14="http://schemas.microsoft.com/office/drawing/2010/main" val="0"/>
+              </a:ext>
+              <a:ext uri="{837473B0-CC2E-450A-ABE3-18F120FF3D39}">
+                <a1611:picAttrSrcUrl xmlns:a1611="http://schemas.microsoft.com/office/drawing/2016/11/main" r:id="rId8"/>
+              </a:ext>
+            </a:extLst>
+          </a:blip>
+          <a:stretch>
+            <a:fillRect/>
+          </a:stretch>
+        </p:blipFill>
+        <p:spPr>
+          <a:xfrm>
+            <a:off x="1909704" y="2709678"/>
+            <a:ext cx="194925" cy="194925"/>
+          </a:xfrm>
+          <a:prstGeom prst="rect">
+            <a:avLst/>
+          </a:prstGeom>
+        </p:spPr>
+      </p:pic>
+      <p:pic>
+        <p:nvPicPr>
+          <p:cNvPr id="96" name="Imagen 95" descr="Imagen que contiene firmar, verde, sostener, señal&#10;&#10;Descripción generada automáticamente">
+            <a:extLst>
+              <a:ext uri="{FF2B5EF4-FFF2-40B4-BE49-F238E27FC236}">
+                <a16:creationId xmlns:a16="http://schemas.microsoft.com/office/drawing/2014/main" id="{4CF294C6-2907-4B8E-AD21-2864DB6307D1}"/>
+              </a:ext>
+            </a:extLst>
+          </p:cNvPr>
+          <p:cNvPicPr>
+            <a:picLocks noChangeAspect="1"/>
+          </p:cNvPicPr>
+          <p:nvPr/>
+        </p:nvPicPr>
+        <p:blipFill>
+          <a:blip r:embed="rId7">
+            <a:extLst>
+              <a:ext uri="{28A0092B-C50C-407E-A947-70E740481C1C}">
+                <a14:useLocalDpi xmlns:a14="http://schemas.microsoft.com/office/drawing/2010/main" val="0"/>
+              </a:ext>
+              <a:ext uri="{837473B0-CC2E-450A-ABE3-18F120FF3D39}">
+                <a1611:picAttrSrcUrl xmlns:a1611="http://schemas.microsoft.com/office/drawing/2016/11/main" r:id="rId8"/>
+              </a:ext>
+            </a:extLst>
+          </a:blip>
+          <a:stretch>
+            <a:fillRect/>
+          </a:stretch>
+        </p:blipFill>
+        <p:spPr>
+          <a:xfrm>
+            <a:off x="1051369" y="2830266"/>
+            <a:ext cx="194925" cy="194925"/>
+          </a:xfrm>
+          <a:prstGeom prst="rect">
+            <a:avLst/>
+          </a:prstGeom>
+        </p:spPr>
+      </p:pic>
+      <p:sp>
+        <p:nvSpPr>
+          <p:cNvPr id="98" name="CuadroTexto 97">
+            <a:extLst>
+              <a:ext uri="{FF2B5EF4-FFF2-40B4-BE49-F238E27FC236}">
+                <a16:creationId xmlns:a16="http://schemas.microsoft.com/office/drawing/2014/main" id="{2473EFFE-D4C9-4717-A184-028C5BA817F2}"/>
+              </a:ext>
+            </a:extLst>
+          </p:cNvPr>
+          <p:cNvSpPr txBox="1"/>
+          <p:nvPr/>
+        </p:nvSpPr>
+        <p:spPr>
+          <a:xfrm>
+            <a:off x="1742388" y="5648684"/>
+            <a:ext cx="1965603" cy="261610"/>
+          </a:xfrm>
+          <a:prstGeom prst="rect">
+            <a:avLst/>
+          </a:prstGeom>
+          <a:noFill/>
+        </p:spPr>
+        <p:txBody>
+          <a:bodyPr wrap="none" rtlCol="0">
+            <a:spAutoFit/>
+          </a:bodyPr>
+          <a:lstStyle/>
+          <a:p>
+            <a:r>
+              <a:rPr lang="es-CO" sz="1100" dirty="0">
+                <a:solidFill>
+                  <a:schemeClr val="bg1"/>
+                </a:solidFill>
+              </a:rPr>
+              <a:t>PRIVATE B SN (192.168.4.0/24)</a:t>
+            </a:r>
+          </a:p>
+        </p:txBody>
+      </p:sp>
+      <p:sp>
+        <p:nvSpPr>
+          <p:cNvPr id="99" name="CuadroTexto 98">
+            <a:extLst>
+              <a:ext uri="{FF2B5EF4-FFF2-40B4-BE49-F238E27FC236}">
+                <a16:creationId xmlns:a16="http://schemas.microsoft.com/office/drawing/2014/main" id="{35116FB4-0FE4-4590-92EA-3C8D336DB795}"/>
+              </a:ext>
+            </a:extLst>
+          </p:cNvPr>
+          <p:cNvSpPr txBox="1"/>
+          <p:nvPr/>
+        </p:nvSpPr>
+        <p:spPr>
+          <a:xfrm>
+            <a:off x="1721052" y="4498119"/>
+            <a:ext cx="1970411" cy="261610"/>
+          </a:xfrm>
+          <a:prstGeom prst="rect">
+            <a:avLst/>
+          </a:prstGeom>
+          <a:noFill/>
+        </p:spPr>
+        <p:txBody>
+          <a:bodyPr wrap="none" rtlCol="0">
+            <a:spAutoFit/>
+          </a:bodyPr>
+          <a:lstStyle/>
+          <a:p>
+            <a:r>
+              <a:rPr lang="es-CO" sz="1100" dirty="0">
+                <a:solidFill>
+                  <a:schemeClr val="bg1"/>
+                </a:solidFill>
+              </a:rPr>
+              <a:t>PRIVATE A SN (192.168.3.0/24)</a:t>
+            </a:r>
+          </a:p>
+        </p:txBody>
+      </p:sp>
+      <p:sp>
+        <p:nvSpPr>
+          <p:cNvPr id="110" name="Rectángulo 109">
+            <a:extLst>
+              <a:ext uri="{FF2B5EF4-FFF2-40B4-BE49-F238E27FC236}">
+                <a16:creationId xmlns:a16="http://schemas.microsoft.com/office/drawing/2014/main" id="{6EAA53EC-0A45-4F90-BB9A-D8B983EBD281}"/>
+              </a:ext>
+            </a:extLst>
+          </p:cNvPr>
+          <p:cNvSpPr/>
+          <p:nvPr/>
+        </p:nvSpPr>
+        <p:spPr>
+          <a:xfrm>
+            <a:off x="3393860" y="1803890"/>
+            <a:ext cx="1331037" cy="473138"/>
+          </a:xfrm>
+          <a:prstGeom prst="rect">
+            <a:avLst/>
+          </a:prstGeom>
+          <a:solidFill>
+            <a:schemeClr val="accent2"/>
+          </a:solidFill>
+          <a:ln>
+            <a:noFill/>
+          </a:ln>
+        </p:spPr>
+        <p:style>
+          <a:lnRef idx="2">
+            <a:schemeClr val="accent1">
+              <a:shade val="50000"/>
+            </a:schemeClr>
+          </a:lnRef>
+          <a:fillRef idx="1">
+            <a:schemeClr val="accent1"/>
+          </a:fillRef>
+          <a:effectRef idx="0">
+            <a:schemeClr val="accent1"/>
+          </a:effectRef>
+          <a:fontRef idx="minor">
+            <a:schemeClr val="lt1"/>
+          </a:fontRef>
+        </p:style>
+        <p:txBody>
+          <a:bodyPr rtlCol="0" anchor="ctr"/>
+          <a:lstStyle/>
+          <a:p>
+            <a:pPr algn="ctr"/>
+            <a:r>
+              <a:rPr lang="es-CO" sz="1100" dirty="0"/>
+              <a:t>DB &gt;</a:t>
+            </a:r>
+          </a:p>
+          <a:p>
+            <a:pPr algn="ctr"/>
+            <a:r>
+              <a:rPr lang="es-CO" sz="1100" b="0" i="0" dirty="0">
+                <a:solidFill>
+                  <a:srgbClr val="000000"/>
+                </a:solidFill>
+                <a:effectLst/>
+                <a:latin typeface="Times New Roman" panose="02020603050405020304" pitchFamily="18" charset="0"/>
+              </a:rPr>
+              <a:t>192.168.4.12</a:t>
+            </a:r>
+            <a:endParaRPr lang="es-CO" sz="1100" dirty="0"/>
+          </a:p>
+        </p:txBody>
+      </p:sp>
+      <p:sp>
+        <p:nvSpPr>
+          <p:cNvPr id="111" name="Rectángulo 110">
+            <a:extLst>
+              <a:ext uri="{FF2B5EF4-FFF2-40B4-BE49-F238E27FC236}">
+                <a16:creationId xmlns:a16="http://schemas.microsoft.com/office/drawing/2014/main" id="{AC069F4A-ED97-4551-A1EB-B194B39E9634}"/>
+              </a:ext>
+            </a:extLst>
+          </p:cNvPr>
+          <p:cNvSpPr/>
+          <p:nvPr/>
+        </p:nvSpPr>
+        <p:spPr>
+          <a:xfrm>
+            <a:off x="3559265" y="2879770"/>
+            <a:ext cx="1331037" cy="473138"/>
+          </a:xfrm>
+          <a:prstGeom prst="rect">
+            <a:avLst/>
+          </a:prstGeom>
+          <a:solidFill>
+            <a:schemeClr val="accent2"/>
+          </a:solidFill>
+          <a:ln>
+            <a:noFill/>
+          </a:ln>
+        </p:spPr>
+        <p:style>
+          <a:lnRef idx="2">
+            <a:schemeClr val="accent1">
+              <a:shade val="50000"/>
+            </a:schemeClr>
+          </a:lnRef>
+          <a:fillRef idx="1">
+            <a:schemeClr val="accent1"/>
+          </a:fillRef>
+          <a:effectRef idx="0">
+            <a:schemeClr val="accent1"/>
+          </a:effectRef>
+          <a:fontRef idx="minor">
+            <a:schemeClr val="lt1"/>
+          </a:fontRef>
+        </p:style>
+        <p:txBody>
+          <a:bodyPr rtlCol="0" anchor="ctr"/>
+          <a:lstStyle/>
+          <a:p>
+            <a:pPr algn="ctr"/>
+            <a:r>
+              <a:rPr lang="es-CO" sz="1100" dirty="0"/>
+              <a:t>DB &gt;</a:t>
+            </a:r>
+          </a:p>
+          <a:p>
+            <a:pPr algn="ctr"/>
+            <a:r>
+              <a:rPr lang="es-CO" sz="1100" b="0" i="0" dirty="0">
+                <a:solidFill>
+                  <a:srgbClr val="000000"/>
+                </a:solidFill>
+                <a:effectLst/>
+                <a:latin typeface="Times New Roman" panose="02020603050405020304" pitchFamily="18" charset="0"/>
+              </a:rPr>
+              <a:t>192.168.4.12</a:t>
+            </a:r>
+            <a:endParaRPr lang="es-CO" sz="1100" dirty="0"/>
+          </a:p>
+        </p:txBody>
+      </p:sp>
+      <p:sp>
+        <p:nvSpPr>
+          <p:cNvPr id="112" name="Rectángulo 111">
+            <a:extLst>
+              <a:ext uri="{FF2B5EF4-FFF2-40B4-BE49-F238E27FC236}">
+                <a16:creationId xmlns:a16="http://schemas.microsoft.com/office/drawing/2014/main" id="{35D27376-CE66-42B5-8B3A-1E76562AE1E3}"/>
+              </a:ext>
+            </a:extLst>
+          </p:cNvPr>
+          <p:cNvSpPr/>
+          <p:nvPr/>
+        </p:nvSpPr>
+        <p:spPr>
+          <a:xfrm>
+            <a:off x="1872784" y="3988899"/>
+            <a:ext cx="1331037" cy="473138"/>
+          </a:xfrm>
+          <a:prstGeom prst="rect">
+            <a:avLst/>
+          </a:prstGeom>
+          <a:solidFill>
+            <a:schemeClr val="accent2"/>
+          </a:solidFill>
+          <a:ln>
+            <a:noFill/>
+          </a:ln>
+        </p:spPr>
+        <p:style>
+          <a:lnRef idx="2">
+            <a:schemeClr val="accent1">
+              <a:shade val="50000"/>
+            </a:schemeClr>
+          </a:lnRef>
+          <a:fillRef idx="1">
+            <a:schemeClr val="accent1"/>
+          </a:fillRef>
+          <a:effectRef idx="0">
+            <a:schemeClr val="accent1"/>
+          </a:effectRef>
+          <a:fontRef idx="minor">
+            <a:schemeClr val="lt1"/>
+          </a:fontRef>
+        </p:style>
+        <p:txBody>
+          <a:bodyPr rtlCol="0" anchor="ctr"/>
+          <a:lstStyle/>
+          <a:p>
+            <a:pPr algn="ctr"/>
+            <a:r>
+              <a:rPr lang="es-CO" sz="1100" dirty="0"/>
+              <a:t>DB &gt;</a:t>
+            </a:r>
+          </a:p>
+          <a:p>
+            <a:pPr algn="ctr"/>
+            <a:r>
+              <a:rPr lang="es-CO" sz="1100" b="0" i="0" dirty="0">
+                <a:solidFill>
+                  <a:srgbClr val="000000"/>
+                </a:solidFill>
+                <a:effectLst/>
+                <a:latin typeface="Times New Roman" panose="02020603050405020304" pitchFamily="18" charset="0"/>
+              </a:rPr>
+              <a:t>192.168.4.12</a:t>
+            </a:r>
+            <a:endParaRPr lang="es-CO" sz="1100" dirty="0"/>
+          </a:p>
+        </p:txBody>
+      </p:sp>
+    </p:spTree>
+    <p:extLst>
+      <p:ext uri="{BB962C8B-B14F-4D97-AF65-F5344CB8AC3E}">
+        <p14:creationId xmlns:p14="http://schemas.microsoft.com/office/powerpoint/2010/main" val="1424392151"/>
       </p:ext>
     </p:extLst>
   </p:cSld>

</xml_diff>